<commit_message>
updated json navigation in powerpoint
</commit_message>
<xml_diff>
--- a/Group 5 Project 1 PowerPoint.pptx
+++ b/Group 5 Project 1 PowerPoint.pptx
@@ -4,25 +4,29 @@
   <p:sldMasterIdLst>
     <p:sldMasterId id="2147483648" r:id="rId1"/>
   </p:sldMasterIdLst>
+  <p:notesMasterIdLst>
+    <p:notesMasterId r:id="rId21"/>
+  </p:notesMasterIdLst>
   <p:sldIdLst>
     <p:sldId id="256" r:id="rId2"/>
     <p:sldId id="270" r:id="rId3"/>
-    <p:sldId id="258" r:id="rId4"/>
-    <p:sldId id="260" r:id="rId5"/>
-    <p:sldId id="259" r:id="rId6"/>
-    <p:sldId id="261" r:id="rId7"/>
-    <p:sldId id="271" r:id="rId8"/>
+    <p:sldId id="278" r:id="rId4"/>
+    <p:sldId id="258" r:id="rId5"/>
+    <p:sldId id="260" r:id="rId6"/>
+    <p:sldId id="259" r:id="rId7"/>
+    <p:sldId id="261" r:id="rId8"/>
     <p:sldId id="262" r:id="rId9"/>
     <p:sldId id="263" r:id="rId10"/>
     <p:sldId id="264" r:id="rId11"/>
     <p:sldId id="265" r:id="rId12"/>
-    <p:sldId id="272" r:id="rId13"/>
-    <p:sldId id="266" r:id="rId14"/>
-    <p:sldId id="267" r:id="rId15"/>
-    <p:sldId id="268" r:id="rId16"/>
-    <p:sldId id="269" r:id="rId17"/>
-    <p:sldId id="274" r:id="rId18"/>
-    <p:sldId id="273" r:id="rId19"/>
+    <p:sldId id="266" r:id="rId13"/>
+    <p:sldId id="267" r:id="rId14"/>
+    <p:sldId id="268" r:id="rId15"/>
+    <p:sldId id="269" r:id="rId16"/>
+    <p:sldId id="274" r:id="rId17"/>
+    <p:sldId id="276" r:id="rId18"/>
+    <p:sldId id="277" r:id="rId19"/>
+    <p:sldId id="273" r:id="rId20"/>
   </p:sldIdLst>
   <p:sldSz cx="12192000" cy="6858000"/>
   <p:notesSz cx="6858000" cy="9144000"/>
@@ -121,7 +125,2655 @@
       </a:defRPr>
     </a:lvl9pPr>
   </p:defaultTextStyle>
+  <p:extLst>
+    <p:ext uri="{EFAFB233-063F-42B5-8137-9DF3F51BA10A}">
+      <p15:sldGuideLst xmlns:p15="http://schemas.microsoft.com/office/powerpoint/2012/main"/>
+    </p:ext>
+  </p:extLst>
 </p:presentation>
+</file>
+
+<file path=ppt/diagrams/colors1.xml><?xml version="1.0" encoding="utf-8"?>
+<dgm:colorsDef xmlns:dgm="http://schemas.openxmlformats.org/drawingml/2006/diagram" xmlns:a="http://schemas.openxmlformats.org/drawingml/2006/main" uniqueId="urn:microsoft.com/office/officeart/2005/8/colors/accent1_2">
+  <dgm:title val=""/>
+  <dgm:desc val=""/>
+  <dgm:catLst>
+    <dgm:cat type="accent1" pri="11200"/>
+  </dgm:catLst>
+  <dgm:styleLbl name="node0">
+    <dgm:fillClrLst meth="repeat">
+      <a:schemeClr val="accent1"/>
+    </dgm:fillClrLst>
+    <dgm:linClrLst meth="repeat">
+      <a:schemeClr val="lt1"/>
+    </dgm:linClrLst>
+    <dgm:effectClrLst/>
+    <dgm:txLinClrLst/>
+    <dgm:txFillClrLst/>
+    <dgm:txEffectClrLst/>
+  </dgm:styleLbl>
+  <dgm:styleLbl name="alignNode1">
+    <dgm:fillClrLst meth="repeat">
+      <a:schemeClr val="accent1"/>
+    </dgm:fillClrLst>
+    <dgm:linClrLst meth="repeat">
+      <a:schemeClr val="accent1"/>
+    </dgm:linClrLst>
+    <dgm:effectClrLst/>
+    <dgm:txLinClrLst/>
+    <dgm:txFillClrLst/>
+    <dgm:txEffectClrLst/>
+  </dgm:styleLbl>
+  <dgm:styleLbl name="node1">
+    <dgm:fillClrLst meth="repeat">
+      <a:schemeClr val="accent1"/>
+    </dgm:fillClrLst>
+    <dgm:linClrLst meth="repeat">
+      <a:schemeClr val="lt1"/>
+    </dgm:linClrLst>
+    <dgm:effectClrLst/>
+    <dgm:txLinClrLst/>
+    <dgm:txFillClrLst/>
+    <dgm:txEffectClrLst/>
+  </dgm:styleLbl>
+  <dgm:styleLbl name="lnNode1">
+    <dgm:fillClrLst meth="repeat">
+      <a:schemeClr val="accent1"/>
+    </dgm:fillClrLst>
+    <dgm:linClrLst meth="repeat">
+      <a:schemeClr val="lt1"/>
+    </dgm:linClrLst>
+    <dgm:effectClrLst/>
+    <dgm:txLinClrLst/>
+    <dgm:txFillClrLst/>
+    <dgm:txEffectClrLst/>
+  </dgm:styleLbl>
+  <dgm:styleLbl name="vennNode1">
+    <dgm:fillClrLst meth="repeat">
+      <a:schemeClr val="accent1">
+        <a:alpha val="50000"/>
+      </a:schemeClr>
+    </dgm:fillClrLst>
+    <dgm:linClrLst meth="repeat">
+      <a:schemeClr val="lt1"/>
+    </dgm:linClrLst>
+    <dgm:effectClrLst/>
+    <dgm:txLinClrLst/>
+    <dgm:txFillClrLst/>
+    <dgm:txEffectClrLst/>
+  </dgm:styleLbl>
+  <dgm:styleLbl name="node2">
+    <dgm:fillClrLst meth="repeat">
+      <a:schemeClr val="accent1"/>
+    </dgm:fillClrLst>
+    <dgm:linClrLst meth="repeat">
+      <a:schemeClr val="lt1"/>
+    </dgm:linClrLst>
+    <dgm:effectClrLst/>
+    <dgm:txLinClrLst/>
+    <dgm:txFillClrLst/>
+    <dgm:txEffectClrLst/>
+  </dgm:styleLbl>
+  <dgm:styleLbl name="node3">
+    <dgm:fillClrLst meth="repeat">
+      <a:schemeClr val="accent1"/>
+    </dgm:fillClrLst>
+    <dgm:linClrLst meth="repeat">
+      <a:schemeClr val="lt1"/>
+    </dgm:linClrLst>
+    <dgm:effectClrLst/>
+    <dgm:txLinClrLst/>
+    <dgm:txFillClrLst/>
+    <dgm:txEffectClrLst/>
+  </dgm:styleLbl>
+  <dgm:styleLbl name="node4">
+    <dgm:fillClrLst meth="repeat">
+      <a:schemeClr val="accent1"/>
+    </dgm:fillClrLst>
+    <dgm:linClrLst meth="repeat">
+      <a:schemeClr val="lt1"/>
+    </dgm:linClrLst>
+    <dgm:effectClrLst/>
+    <dgm:txLinClrLst/>
+    <dgm:txFillClrLst/>
+    <dgm:txEffectClrLst/>
+  </dgm:styleLbl>
+  <dgm:styleLbl name="fgImgPlace1">
+    <dgm:fillClrLst meth="repeat">
+      <a:schemeClr val="accent1">
+        <a:tint val="50000"/>
+      </a:schemeClr>
+    </dgm:fillClrLst>
+    <dgm:linClrLst meth="repeat">
+      <a:schemeClr val="lt1"/>
+    </dgm:linClrLst>
+    <dgm:effectClrLst/>
+    <dgm:txLinClrLst/>
+    <dgm:txFillClrLst meth="repeat">
+      <a:schemeClr val="lt1"/>
+    </dgm:txFillClrLst>
+    <dgm:txEffectClrLst/>
+  </dgm:styleLbl>
+  <dgm:styleLbl name="alignImgPlace1">
+    <dgm:fillClrLst meth="repeat">
+      <a:schemeClr val="accent1">
+        <a:tint val="50000"/>
+      </a:schemeClr>
+    </dgm:fillClrLst>
+    <dgm:linClrLst meth="repeat">
+      <a:schemeClr val="lt1"/>
+    </dgm:linClrLst>
+    <dgm:effectClrLst/>
+    <dgm:txLinClrLst/>
+    <dgm:txFillClrLst meth="repeat">
+      <a:schemeClr val="lt1"/>
+    </dgm:txFillClrLst>
+    <dgm:txEffectClrLst/>
+  </dgm:styleLbl>
+  <dgm:styleLbl name="bgImgPlace1">
+    <dgm:fillClrLst meth="repeat">
+      <a:schemeClr val="accent1">
+        <a:tint val="50000"/>
+      </a:schemeClr>
+    </dgm:fillClrLst>
+    <dgm:linClrLst meth="repeat">
+      <a:schemeClr val="lt1"/>
+    </dgm:linClrLst>
+    <dgm:effectClrLst/>
+    <dgm:txLinClrLst/>
+    <dgm:txFillClrLst meth="repeat">
+      <a:schemeClr val="lt1"/>
+    </dgm:txFillClrLst>
+    <dgm:txEffectClrLst/>
+  </dgm:styleLbl>
+  <dgm:styleLbl name="sibTrans2D1">
+    <dgm:fillClrLst meth="repeat">
+      <a:schemeClr val="accent1">
+        <a:tint val="60000"/>
+      </a:schemeClr>
+    </dgm:fillClrLst>
+    <dgm:linClrLst meth="repeat">
+      <a:schemeClr val="accent1">
+        <a:tint val="60000"/>
+      </a:schemeClr>
+    </dgm:linClrLst>
+    <dgm:effectClrLst/>
+    <dgm:txLinClrLst/>
+    <dgm:txFillClrLst/>
+    <dgm:txEffectClrLst/>
+  </dgm:styleLbl>
+  <dgm:styleLbl name="fgSibTrans2D1">
+    <dgm:fillClrLst meth="repeat">
+      <a:schemeClr val="accent1">
+        <a:tint val="60000"/>
+      </a:schemeClr>
+    </dgm:fillClrLst>
+    <dgm:linClrLst meth="repeat">
+      <a:schemeClr val="accent1">
+        <a:tint val="60000"/>
+      </a:schemeClr>
+    </dgm:linClrLst>
+    <dgm:effectClrLst/>
+    <dgm:txLinClrLst/>
+    <dgm:txFillClrLst/>
+    <dgm:txEffectClrLst/>
+  </dgm:styleLbl>
+  <dgm:styleLbl name="bgSibTrans2D1">
+    <dgm:fillClrLst meth="repeat">
+      <a:schemeClr val="accent1">
+        <a:tint val="60000"/>
+      </a:schemeClr>
+    </dgm:fillClrLst>
+    <dgm:linClrLst meth="repeat">
+      <a:schemeClr val="accent1">
+        <a:tint val="60000"/>
+      </a:schemeClr>
+    </dgm:linClrLst>
+    <dgm:effectClrLst/>
+    <dgm:txLinClrLst/>
+    <dgm:txFillClrLst/>
+    <dgm:txEffectClrLst/>
+  </dgm:styleLbl>
+  <dgm:styleLbl name="sibTrans1D1">
+    <dgm:fillClrLst meth="repeat">
+      <a:schemeClr val="accent1"/>
+    </dgm:fillClrLst>
+    <dgm:linClrLst meth="repeat">
+      <a:schemeClr val="accent1"/>
+    </dgm:linClrLst>
+    <dgm:effectClrLst/>
+    <dgm:txLinClrLst/>
+    <dgm:txFillClrLst meth="repeat">
+      <a:schemeClr val="tx1"/>
+    </dgm:txFillClrLst>
+    <dgm:txEffectClrLst/>
+  </dgm:styleLbl>
+  <dgm:styleLbl name="callout">
+    <dgm:fillClrLst meth="repeat">
+      <a:schemeClr val="accent1"/>
+    </dgm:fillClrLst>
+    <dgm:linClrLst meth="repeat">
+      <a:schemeClr val="accent1">
+        <a:tint val="50000"/>
+      </a:schemeClr>
+    </dgm:linClrLst>
+    <dgm:effectClrLst/>
+    <dgm:txLinClrLst/>
+    <dgm:txFillClrLst meth="repeat">
+      <a:schemeClr val="tx1"/>
+    </dgm:txFillClrLst>
+    <dgm:txEffectClrLst/>
+  </dgm:styleLbl>
+  <dgm:styleLbl name="asst0">
+    <dgm:fillClrLst meth="repeat">
+      <a:schemeClr val="accent1"/>
+    </dgm:fillClrLst>
+    <dgm:linClrLst meth="repeat">
+      <a:schemeClr val="lt1"/>
+    </dgm:linClrLst>
+    <dgm:effectClrLst/>
+    <dgm:txLinClrLst/>
+    <dgm:txFillClrLst/>
+    <dgm:txEffectClrLst/>
+  </dgm:styleLbl>
+  <dgm:styleLbl name="asst1">
+    <dgm:fillClrLst meth="repeat">
+      <a:schemeClr val="accent1"/>
+    </dgm:fillClrLst>
+    <dgm:linClrLst meth="repeat">
+      <a:schemeClr val="lt1"/>
+    </dgm:linClrLst>
+    <dgm:effectClrLst/>
+    <dgm:txLinClrLst/>
+    <dgm:txFillClrLst/>
+    <dgm:txEffectClrLst/>
+  </dgm:styleLbl>
+  <dgm:styleLbl name="asst2">
+    <dgm:fillClrLst meth="repeat">
+      <a:schemeClr val="accent1"/>
+    </dgm:fillClrLst>
+    <dgm:linClrLst meth="repeat">
+      <a:schemeClr val="lt1"/>
+    </dgm:linClrLst>
+    <dgm:effectClrLst/>
+    <dgm:txLinClrLst/>
+    <dgm:txFillClrLst/>
+    <dgm:txEffectClrLst/>
+  </dgm:styleLbl>
+  <dgm:styleLbl name="asst3">
+    <dgm:fillClrLst meth="repeat">
+      <a:schemeClr val="accent1"/>
+    </dgm:fillClrLst>
+    <dgm:linClrLst meth="repeat">
+      <a:schemeClr val="lt1"/>
+    </dgm:linClrLst>
+    <dgm:effectClrLst/>
+    <dgm:txLinClrLst/>
+    <dgm:txFillClrLst/>
+    <dgm:txEffectClrLst/>
+  </dgm:styleLbl>
+  <dgm:styleLbl name="asst4">
+    <dgm:fillClrLst meth="repeat">
+      <a:schemeClr val="accent1"/>
+    </dgm:fillClrLst>
+    <dgm:linClrLst meth="repeat">
+      <a:schemeClr val="lt1"/>
+    </dgm:linClrLst>
+    <dgm:effectClrLst/>
+    <dgm:txLinClrLst/>
+    <dgm:txFillClrLst/>
+    <dgm:txEffectClrLst/>
+  </dgm:styleLbl>
+  <dgm:styleLbl name="parChTrans2D1">
+    <dgm:fillClrLst meth="repeat">
+      <a:schemeClr val="accent1">
+        <a:tint val="60000"/>
+      </a:schemeClr>
+    </dgm:fillClrLst>
+    <dgm:linClrLst meth="repeat">
+      <a:schemeClr val="accent1">
+        <a:tint val="60000"/>
+      </a:schemeClr>
+    </dgm:linClrLst>
+    <dgm:effectClrLst/>
+    <dgm:txLinClrLst/>
+    <dgm:txFillClrLst meth="repeat">
+      <a:schemeClr val="lt1"/>
+    </dgm:txFillClrLst>
+    <dgm:txEffectClrLst/>
+  </dgm:styleLbl>
+  <dgm:styleLbl name="parChTrans2D2">
+    <dgm:fillClrLst meth="repeat">
+      <a:schemeClr val="accent1"/>
+    </dgm:fillClrLst>
+    <dgm:linClrLst meth="repeat">
+      <a:schemeClr val="accent1"/>
+    </dgm:linClrLst>
+    <dgm:effectClrLst/>
+    <dgm:txLinClrLst/>
+    <dgm:txFillClrLst meth="repeat">
+      <a:schemeClr val="lt1"/>
+    </dgm:txFillClrLst>
+    <dgm:txEffectClrLst/>
+  </dgm:styleLbl>
+  <dgm:styleLbl name="parChTrans2D3">
+    <dgm:fillClrLst meth="repeat">
+      <a:schemeClr val="accent1"/>
+    </dgm:fillClrLst>
+    <dgm:linClrLst meth="repeat">
+      <a:schemeClr val="accent1"/>
+    </dgm:linClrLst>
+    <dgm:effectClrLst/>
+    <dgm:txLinClrLst/>
+    <dgm:txFillClrLst meth="repeat">
+      <a:schemeClr val="lt1"/>
+    </dgm:txFillClrLst>
+    <dgm:txEffectClrLst/>
+  </dgm:styleLbl>
+  <dgm:styleLbl name="parChTrans2D4">
+    <dgm:fillClrLst meth="repeat">
+      <a:schemeClr val="accent1"/>
+    </dgm:fillClrLst>
+    <dgm:linClrLst meth="repeat">
+      <a:schemeClr val="accent1"/>
+    </dgm:linClrLst>
+    <dgm:effectClrLst/>
+    <dgm:txLinClrLst/>
+    <dgm:txFillClrLst meth="repeat">
+      <a:schemeClr val="lt1"/>
+    </dgm:txFillClrLst>
+    <dgm:txEffectClrLst/>
+  </dgm:styleLbl>
+  <dgm:styleLbl name="parChTrans1D1">
+    <dgm:fillClrLst meth="repeat">
+      <a:schemeClr val="accent1"/>
+    </dgm:fillClrLst>
+    <dgm:linClrLst meth="repeat">
+      <a:schemeClr val="accent1">
+        <a:shade val="60000"/>
+      </a:schemeClr>
+    </dgm:linClrLst>
+    <dgm:effectClrLst/>
+    <dgm:txLinClrLst/>
+    <dgm:txFillClrLst meth="repeat">
+      <a:schemeClr val="tx1"/>
+    </dgm:txFillClrLst>
+    <dgm:txEffectClrLst/>
+  </dgm:styleLbl>
+  <dgm:styleLbl name="parChTrans1D2">
+    <dgm:fillClrLst meth="repeat">
+      <a:schemeClr val="accent1"/>
+    </dgm:fillClrLst>
+    <dgm:linClrLst meth="repeat">
+      <a:schemeClr val="accent1">
+        <a:shade val="60000"/>
+      </a:schemeClr>
+    </dgm:linClrLst>
+    <dgm:effectClrLst/>
+    <dgm:txLinClrLst/>
+    <dgm:txFillClrLst meth="repeat">
+      <a:schemeClr val="tx1"/>
+    </dgm:txFillClrLst>
+    <dgm:txEffectClrLst/>
+  </dgm:styleLbl>
+  <dgm:styleLbl name="parChTrans1D3">
+    <dgm:fillClrLst meth="repeat">
+      <a:schemeClr val="accent1"/>
+    </dgm:fillClrLst>
+    <dgm:linClrLst meth="repeat">
+      <a:schemeClr val="accent1">
+        <a:shade val="80000"/>
+      </a:schemeClr>
+    </dgm:linClrLst>
+    <dgm:effectClrLst/>
+    <dgm:txLinClrLst/>
+    <dgm:txFillClrLst meth="repeat">
+      <a:schemeClr val="tx1"/>
+    </dgm:txFillClrLst>
+    <dgm:txEffectClrLst/>
+  </dgm:styleLbl>
+  <dgm:styleLbl name="parChTrans1D4">
+    <dgm:fillClrLst meth="repeat">
+      <a:schemeClr val="accent1"/>
+    </dgm:fillClrLst>
+    <dgm:linClrLst meth="repeat">
+      <a:schemeClr val="accent1">
+        <a:shade val="80000"/>
+      </a:schemeClr>
+    </dgm:linClrLst>
+    <dgm:effectClrLst/>
+    <dgm:txLinClrLst/>
+    <dgm:txFillClrLst meth="repeat">
+      <a:schemeClr val="tx1"/>
+    </dgm:txFillClrLst>
+    <dgm:txEffectClrLst/>
+  </dgm:styleLbl>
+  <dgm:styleLbl name="fgAcc1">
+    <dgm:fillClrLst meth="repeat">
+      <a:schemeClr val="lt1">
+        <a:alpha val="90000"/>
+      </a:schemeClr>
+    </dgm:fillClrLst>
+    <dgm:linClrLst meth="repeat">
+      <a:schemeClr val="accent1"/>
+    </dgm:linClrLst>
+    <dgm:effectClrLst/>
+    <dgm:txLinClrLst/>
+    <dgm:txFillClrLst meth="repeat">
+      <a:schemeClr val="dk1"/>
+    </dgm:txFillClrLst>
+    <dgm:txEffectClrLst/>
+  </dgm:styleLbl>
+  <dgm:styleLbl name="conFgAcc1">
+    <dgm:fillClrLst meth="repeat">
+      <a:schemeClr val="lt1">
+        <a:alpha val="90000"/>
+      </a:schemeClr>
+    </dgm:fillClrLst>
+    <dgm:linClrLst meth="repeat">
+      <a:schemeClr val="accent1"/>
+    </dgm:linClrLst>
+    <dgm:effectClrLst/>
+    <dgm:txLinClrLst/>
+    <dgm:txFillClrLst meth="repeat">
+      <a:schemeClr val="dk1"/>
+    </dgm:txFillClrLst>
+    <dgm:txEffectClrLst/>
+  </dgm:styleLbl>
+  <dgm:styleLbl name="alignAcc1">
+    <dgm:fillClrLst meth="repeat">
+      <a:schemeClr val="lt1">
+        <a:alpha val="90000"/>
+      </a:schemeClr>
+    </dgm:fillClrLst>
+    <dgm:linClrLst meth="repeat">
+      <a:schemeClr val="accent1"/>
+    </dgm:linClrLst>
+    <dgm:effectClrLst/>
+    <dgm:txLinClrLst/>
+    <dgm:txFillClrLst meth="repeat">
+      <a:schemeClr val="dk1"/>
+    </dgm:txFillClrLst>
+    <dgm:txEffectClrLst/>
+  </dgm:styleLbl>
+  <dgm:styleLbl name="trAlignAcc1">
+    <dgm:fillClrLst meth="repeat">
+      <a:schemeClr val="lt1">
+        <a:alpha val="40000"/>
+      </a:schemeClr>
+    </dgm:fillClrLst>
+    <dgm:linClrLst meth="repeat">
+      <a:schemeClr val="accent1"/>
+    </dgm:linClrLst>
+    <dgm:effectClrLst/>
+    <dgm:txLinClrLst/>
+    <dgm:txFillClrLst meth="repeat">
+      <a:schemeClr val="dk1"/>
+    </dgm:txFillClrLst>
+    <dgm:txEffectClrLst/>
+  </dgm:styleLbl>
+  <dgm:styleLbl name="bgAcc1">
+    <dgm:fillClrLst meth="repeat">
+      <a:schemeClr val="lt1">
+        <a:alpha val="90000"/>
+      </a:schemeClr>
+    </dgm:fillClrLst>
+    <dgm:linClrLst meth="repeat">
+      <a:schemeClr val="accent1"/>
+    </dgm:linClrLst>
+    <dgm:effectClrLst/>
+    <dgm:txLinClrLst/>
+    <dgm:txFillClrLst meth="repeat">
+      <a:schemeClr val="dk1"/>
+    </dgm:txFillClrLst>
+    <dgm:txEffectClrLst/>
+  </dgm:styleLbl>
+  <dgm:styleLbl name="solidFgAcc1">
+    <dgm:fillClrLst meth="repeat">
+      <a:schemeClr val="lt1"/>
+    </dgm:fillClrLst>
+    <dgm:linClrLst meth="repeat">
+      <a:schemeClr val="accent1"/>
+    </dgm:linClrLst>
+    <dgm:effectClrLst/>
+    <dgm:txLinClrLst/>
+    <dgm:txFillClrLst meth="repeat">
+      <a:schemeClr val="dk1"/>
+    </dgm:txFillClrLst>
+    <dgm:txEffectClrLst/>
+  </dgm:styleLbl>
+  <dgm:styleLbl name="solidAlignAcc1">
+    <dgm:fillClrLst meth="repeat">
+      <a:schemeClr val="lt1"/>
+    </dgm:fillClrLst>
+    <dgm:linClrLst meth="repeat">
+      <a:schemeClr val="accent1"/>
+    </dgm:linClrLst>
+    <dgm:effectClrLst/>
+    <dgm:txLinClrLst/>
+    <dgm:txFillClrLst meth="repeat">
+      <a:schemeClr val="dk1"/>
+    </dgm:txFillClrLst>
+    <dgm:txEffectClrLst/>
+  </dgm:styleLbl>
+  <dgm:styleLbl name="solidBgAcc1">
+    <dgm:fillClrLst meth="repeat">
+      <a:schemeClr val="lt1"/>
+    </dgm:fillClrLst>
+    <dgm:linClrLst meth="repeat">
+      <a:schemeClr val="accent1"/>
+    </dgm:linClrLst>
+    <dgm:effectClrLst/>
+    <dgm:txLinClrLst/>
+    <dgm:txFillClrLst meth="repeat">
+      <a:schemeClr val="dk1"/>
+    </dgm:txFillClrLst>
+    <dgm:txEffectClrLst/>
+  </dgm:styleLbl>
+  <dgm:styleLbl name="fgAccFollowNode1">
+    <dgm:fillClrLst meth="repeat">
+      <a:schemeClr val="accent1">
+        <a:alpha val="90000"/>
+        <a:tint val="40000"/>
+      </a:schemeClr>
+    </dgm:fillClrLst>
+    <dgm:linClrLst meth="repeat">
+      <a:schemeClr val="accent1">
+        <a:alpha val="90000"/>
+        <a:tint val="40000"/>
+      </a:schemeClr>
+    </dgm:linClrLst>
+    <dgm:effectClrLst/>
+    <dgm:txLinClrLst/>
+    <dgm:txFillClrLst meth="repeat">
+      <a:schemeClr val="dk1"/>
+    </dgm:txFillClrLst>
+    <dgm:txEffectClrLst/>
+  </dgm:styleLbl>
+  <dgm:styleLbl name="alignAccFollowNode1">
+    <dgm:fillClrLst meth="repeat">
+      <a:schemeClr val="accent1">
+        <a:alpha val="90000"/>
+        <a:tint val="40000"/>
+      </a:schemeClr>
+    </dgm:fillClrLst>
+    <dgm:linClrLst meth="repeat">
+      <a:schemeClr val="accent1">
+        <a:alpha val="90000"/>
+        <a:tint val="40000"/>
+      </a:schemeClr>
+    </dgm:linClrLst>
+    <dgm:effectClrLst/>
+    <dgm:txLinClrLst/>
+    <dgm:txFillClrLst meth="repeat">
+      <a:schemeClr val="dk1"/>
+    </dgm:txFillClrLst>
+    <dgm:txEffectClrLst/>
+  </dgm:styleLbl>
+  <dgm:styleLbl name="bgAccFollowNode1">
+    <dgm:fillClrLst meth="repeat">
+      <a:schemeClr val="accent1">
+        <a:alpha val="90000"/>
+        <a:tint val="40000"/>
+      </a:schemeClr>
+    </dgm:fillClrLst>
+    <dgm:linClrLst meth="repeat">
+      <a:schemeClr val="accent1">
+        <a:alpha val="90000"/>
+        <a:tint val="40000"/>
+      </a:schemeClr>
+    </dgm:linClrLst>
+    <dgm:effectClrLst/>
+    <dgm:txLinClrLst/>
+    <dgm:txFillClrLst meth="repeat">
+      <a:schemeClr val="dk1"/>
+    </dgm:txFillClrLst>
+    <dgm:txEffectClrLst/>
+  </dgm:styleLbl>
+  <dgm:styleLbl name="fgAcc0">
+    <dgm:fillClrLst meth="repeat">
+      <a:schemeClr val="lt1">
+        <a:alpha val="90000"/>
+      </a:schemeClr>
+    </dgm:fillClrLst>
+    <dgm:linClrLst meth="repeat">
+      <a:schemeClr val="accent1"/>
+    </dgm:linClrLst>
+    <dgm:effectClrLst/>
+    <dgm:txLinClrLst/>
+    <dgm:txFillClrLst meth="repeat">
+      <a:schemeClr val="dk1"/>
+    </dgm:txFillClrLst>
+    <dgm:txEffectClrLst/>
+  </dgm:styleLbl>
+  <dgm:styleLbl name="fgAcc2">
+    <dgm:fillClrLst meth="repeat">
+      <a:schemeClr val="lt1">
+        <a:alpha val="90000"/>
+      </a:schemeClr>
+    </dgm:fillClrLst>
+    <dgm:linClrLst meth="repeat">
+      <a:schemeClr val="accent1"/>
+    </dgm:linClrLst>
+    <dgm:effectClrLst/>
+    <dgm:txLinClrLst/>
+    <dgm:txFillClrLst meth="repeat">
+      <a:schemeClr val="dk1"/>
+    </dgm:txFillClrLst>
+    <dgm:txEffectClrLst/>
+  </dgm:styleLbl>
+  <dgm:styleLbl name="fgAcc3">
+    <dgm:fillClrLst meth="repeat">
+      <a:schemeClr val="lt1">
+        <a:alpha val="90000"/>
+      </a:schemeClr>
+    </dgm:fillClrLst>
+    <dgm:linClrLst meth="repeat">
+      <a:schemeClr val="accent1"/>
+    </dgm:linClrLst>
+    <dgm:effectClrLst/>
+    <dgm:txLinClrLst/>
+    <dgm:txFillClrLst meth="repeat">
+      <a:schemeClr val="dk1"/>
+    </dgm:txFillClrLst>
+    <dgm:txEffectClrLst/>
+  </dgm:styleLbl>
+  <dgm:styleLbl name="fgAcc4">
+    <dgm:fillClrLst meth="repeat">
+      <a:schemeClr val="lt1">
+        <a:alpha val="90000"/>
+      </a:schemeClr>
+    </dgm:fillClrLst>
+    <dgm:linClrLst meth="repeat">
+      <a:schemeClr val="accent1"/>
+    </dgm:linClrLst>
+    <dgm:effectClrLst/>
+    <dgm:txLinClrLst/>
+    <dgm:txFillClrLst meth="repeat">
+      <a:schemeClr val="dk1"/>
+    </dgm:txFillClrLst>
+    <dgm:txEffectClrLst/>
+  </dgm:styleLbl>
+  <dgm:styleLbl name="bgShp">
+    <dgm:fillClrLst meth="repeat">
+      <a:schemeClr val="accent1">
+        <a:tint val="40000"/>
+      </a:schemeClr>
+    </dgm:fillClrLst>
+    <dgm:linClrLst meth="repeat">
+      <a:schemeClr val="accent1"/>
+    </dgm:linClrLst>
+    <dgm:effectClrLst/>
+    <dgm:txLinClrLst/>
+    <dgm:txFillClrLst meth="repeat">
+      <a:schemeClr val="dk1"/>
+    </dgm:txFillClrLst>
+    <dgm:txEffectClrLst/>
+  </dgm:styleLbl>
+  <dgm:styleLbl name="dkBgShp">
+    <dgm:fillClrLst meth="repeat">
+      <a:schemeClr val="accent1">
+        <a:shade val="80000"/>
+      </a:schemeClr>
+    </dgm:fillClrLst>
+    <dgm:linClrLst meth="repeat">
+      <a:schemeClr val="accent1"/>
+    </dgm:linClrLst>
+    <dgm:effectClrLst/>
+    <dgm:txLinClrLst/>
+    <dgm:txFillClrLst meth="repeat">
+      <a:schemeClr val="lt1"/>
+    </dgm:txFillClrLst>
+    <dgm:txEffectClrLst/>
+  </dgm:styleLbl>
+  <dgm:styleLbl name="trBgShp">
+    <dgm:fillClrLst meth="repeat">
+      <a:schemeClr val="accent1">
+        <a:tint val="50000"/>
+        <a:alpha val="40000"/>
+      </a:schemeClr>
+    </dgm:fillClrLst>
+    <dgm:linClrLst meth="repeat">
+      <a:schemeClr val="accent1"/>
+    </dgm:linClrLst>
+    <dgm:effectClrLst/>
+    <dgm:txLinClrLst/>
+    <dgm:txFillClrLst meth="repeat">
+      <a:schemeClr val="lt1"/>
+    </dgm:txFillClrLst>
+    <dgm:txEffectClrLst/>
+  </dgm:styleLbl>
+  <dgm:styleLbl name="fgShp">
+    <dgm:fillClrLst meth="repeat">
+      <a:schemeClr val="accent1">
+        <a:tint val="60000"/>
+      </a:schemeClr>
+    </dgm:fillClrLst>
+    <dgm:linClrLst meth="repeat">
+      <a:schemeClr val="lt1"/>
+    </dgm:linClrLst>
+    <dgm:effectClrLst/>
+    <dgm:txLinClrLst/>
+    <dgm:txFillClrLst meth="repeat">
+      <a:schemeClr val="dk1"/>
+    </dgm:txFillClrLst>
+    <dgm:txEffectClrLst/>
+  </dgm:styleLbl>
+  <dgm:styleLbl name="revTx">
+    <dgm:fillClrLst meth="repeat">
+      <a:schemeClr val="lt1">
+        <a:alpha val="0"/>
+      </a:schemeClr>
+    </dgm:fillClrLst>
+    <dgm:linClrLst meth="repeat">
+      <a:schemeClr val="dk1">
+        <a:alpha val="0"/>
+      </a:schemeClr>
+    </dgm:linClrLst>
+    <dgm:effectClrLst/>
+    <dgm:txLinClrLst/>
+    <dgm:txFillClrLst meth="repeat">
+      <a:schemeClr val="tx1"/>
+    </dgm:txFillClrLst>
+    <dgm:txEffectClrLst/>
+  </dgm:styleLbl>
+</dgm:colorsDef>
+</file>
+
+<file path=ppt/diagrams/data1.xml><?xml version="1.0" encoding="utf-8"?>
+<dgm:dataModel xmlns:dgm="http://schemas.openxmlformats.org/drawingml/2006/diagram" xmlns:a="http://schemas.openxmlformats.org/drawingml/2006/main">
+  <dgm:ptLst>
+    <dgm:pt modelId="{2DD7FD4E-49F2-4115-B8D0-E67B3A5030AA}" type="doc">
+      <dgm:prSet loTypeId="urn:microsoft.com/office/officeart/2005/8/layout/vList2" loCatId="list" qsTypeId="urn:microsoft.com/office/officeart/2005/8/quickstyle/simple3" qsCatId="simple" csTypeId="urn:microsoft.com/office/officeart/2005/8/colors/accent1_2" csCatId="accent1" phldr="1"/>
+      <dgm:spPr/>
+      <dgm:t>
+        <a:bodyPr/>
+        <a:lstStyle/>
+        <a:p>
+          <a:endParaRPr lang="en-US"/>
+        </a:p>
+      </dgm:t>
+    </dgm:pt>
+    <dgm:pt modelId="{D674C792-23AE-4629-99A8-24C62634B680}">
+      <dgm:prSet/>
+      <dgm:spPr>
+        <a:solidFill>
+          <a:srgbClr val="FFFFE5"/>
+        </a:solidFill>
+      </dgm:spPr>
+      <dgm:t>
+        <a:bodyPr/>
+        <a:lstStyle/>
+        <a:p>
+          <a:r>
+            <a:rPr lang="en-US" dirty="0"/>
+            <a:t>828 Articles extracted for the month of Sept.1 - Oct5.</a:t>
+          </a:r>
+        </a:p>
+        <a:p>
+          <a:r>
+            <a:rPr lang="en-US" dirty="0"/>
+            <a:t>544 Articles (66%) had 1 or more Keywords</a:t>
+          </a:r>
+        </a:p>
+        <a:p>
+          <a:r>
+            <a:rPr lang="en-US" dirty="0"/>
+            <a:t>(34%) of Articles used none</a:t>
+          </a:r>
+        </a:p>
+        <a:p>
+          <a:r>
+            <a:rPr lang="en-US" dirty="0"/>
+            <a:t>544 Articles used 1657 Unique Keywords with a total usage count of 3356</a:t>
+          </a:r>
+        </a:p>
+        <a:p>
+          <a:r>
+            <a:rPr lang="en-US" dirty="0"/>
+            <a:t>57 Keywords (3.4%) represented 50% of Keywords used</a:t>
+          </a:r>
+        </a:p>
+        <a:p>
+          <a:r>
+            <a:rPr lang="en-US" b="1" dirty="0"/>
+            <a:t>Top 25% of Percent of ALL Keyword usage is Represented by just 16 Keywords</a:t>
+          </a:r>
+          <a:endParaRPr lang="en-US" dirty="0"/>
+        </a:p>
+        <a:p>
+          <a:r>
+            <a:rPr lang="en-US" b="1" dirty="0"/>
+            <a:t>66% of those are about U.S. Politics</a:t>
+          </a:r>
+          <a:endParaRPr lang="en-US" dirty="0"/>
+        </a:p>
+      </dgm:t>
+    </dgm:pt>
+    <dgm:pt modelId="{1DF307D6-1068-4E3D-8ABE-C1F0753F0D6F}" type="parTrans" cxnId="{F4AB73B8-AE05-46DB-BF5F-B56BFC3B38A9}">
+      <dgm:prSet/>
+      <dgm:spPr/>
+      <dgm:t>
+        <a:bodyPr/>
+        <a:lstStyle/>
+        <a:p>
+          <a:endParaRPr lang="en-US"/>
+        </a:p>
+      </dgm:t>
+    </dgm:pt>
+    <dgm:pt modelId="{6CEA3719-50E0-4DE9-A8F9-AADEB39484A4}" type="sibTrans" cxnId="{F4AB73B8-AE05-46DB-BF5F-B56BFC3B38A9}">
+      <dgm:prSet/>
+      <dgm:spPr/>
+      <dgm:t>
+        <a:bodyPr/>
+        <a:lstStyle/>
+        <a:p>
+          <a:endParaRPr lang="en-US"/>
+        </a:p>
+      </dgm:t>
+    </dgm:pt>
+    <dgm:pt modelId="{64CFACE0-4348-4DD5-B42E-9A561CED309F}" type="pres">
+      <dgm:prSet presAssocID="{2DD7FD4E-49F2-4115-B8D0-E67B3A5030AA}" presName="linear" presStyleCnt="0">
+        <dgm:presLayoutVars>
+          <dgm:animLvl val="lvl"/>
+          <dgm:resizeHandles val="exact"/>
+        </dgm:presLayoutVars>
+      </dgm:prSet>
+      <dgm:spPr/>
+    </dgm:pt>
+    <dgm:pt modelId="{FBB72779-1997-4F3D-A087-408671E7C7A6}" type="pres">
+      <dgm:prSet presAssocID="{D674C792-23AE-4629-99A8-24C62634B680}" presName="parentText" presStyleLbl="node1" presStyleIdx="0" presStyleCnt="1">
+        <dgm:presLayoutVars>
+          <dgm:chMax val="0"/>
+          <dgm:bulletEnabled val="1"/>
+        </dgm:presLayoutVars>
+      </dgm:prSet>
+      <dgm:spPr/>
+    </dgm:pt>
+  </dgm:ptLst>
+  <dgm:cxnLst>
+    <dgm:cxn modelId="{CF464E64-4F8B-4448-9029-EF29D38AFBD8}" type="presOf" srcId="{D674C792-23AE-4629-99A8-24C62634B680}" destId="{FBB72779-1997-4F3D-A087-408671E7C7A6}" srcOrd="0" destOrd="0" presId="urn:microsoft.com/office/officeart/2005/8/layout/vList2"/>
+    <dgm:cxn modelId="{7760B36A-8209-4111-8520-86F2B27E1429}" type="presOf" srcId="{2DD7FD4E-49F2-4115-B8D0-E67B3A5030AA}" destId="{64CFACE0-4348-4DD5-B42E-9A561CED309F}" srcOrd="0" destOrd="0" presId="urn:microsoft.com/office/officeart/2005/8/layout/vList2"/>
+    <dgm:cxn modelId="{F4AB73B8-AE05-46DB-BF5F-B56BFC3B38A9}" srcId="{2DD7FD4E-49F2-4115-B8D0-E67B3A5030AA}" destId="{D674C792-23AE-4629-99A8-24C62634B680}" srcOrd="0" destOrd="0" parTransId="{1DF307D6-1068-4E3D-8ABE-C1F0753F0D6F}" sibTransId="{6CEA3719-50E0-4DE9-A8F9-AADEB39484A4}"/>
+    <dgm:cxn modelId="{8E8E12FD-9C8E-4A73-8BF6-347EB9273382}" type="presParOf" srcId="{64CFACE0-4348-4DD5-B42E-9A561CED309F}" destId="{FBB72779-1997-4F3D-A087-408671E7C7A6}" srcOrd="0" destOrd="0" presId="urn:microsoft.com/office/officeart/2005/8/layout/vList2"/>
+  </dgm:cxnLst>
+  <dgm:bg/>
+  <dgm:whole/>
+  <dgm:extLst>
+    <a:ext uri="http://schemas.microsoft.com/office/drawing/2008/diagram">
+      <dsp:dataModelExt xmlns:dsp="http://schemas.microsoft.com/office/drawing/2008/diagram" relId="rId7" minVer="http://schemas.openxmlformats.org/drawingml/2006/diagram"/>
+    </a:ext>
+  </dgm:extLst>
+</dgm:dataModel>
+</file>
+
+<file path=ppt/diagrams/drawing1.xml><?xml version="1.0" encoding="utf-8"?>
+<dsp:drawing xmlns:dgm="http://schemas.openxmlformats.org/drawingml/2006/diagram" xmlns:dsp="http://schemas.microsoft.com/office/drawing/2008/diagram" xmlns:a="http://schemas.openxmlformats.org/drawingml/2006/main">
+  <dsp:spTree>
+    <dsp:nvGrpSpPr>
+      <dsp:cNvPr id="0" name=""/>
+      <dsp:cNvGrpSpPr/>
+    </dsp:nvGrpSpPr>
+    <dsp:grpSpPr/>
+    <dsp:sp modelId="{FBB72779-1997-4F3D-A087-408671E7C7A6}">
+      <dsp:nvSpPr>
+        <dsp:cNvPr id="0" name=""/>
+        <dsp:cNvSpPr/>
+      </dsp:nvSpPr>
+      <dsp:spPr>
+        <a:xfrm>
+          <a:off x="0" y="41317"/>
+          <a:ext cx="3416395" cy="1872000"/>
+        </a:xfrm>
+        <a:prstGeom prst="roundRect">
+          <a:avLst/>
+        </a:prstGeom>
+        <a:solidFill>
+          <a:srgbClr val="FFFFE5"/>
+        </a:solidFill>
+        <a:ln>
+          <a:noFill/>
+        </a:ln>
+        <a:effectLst/>
+        <a:scene3d>
+          <a:camera prst="orthographicFront"/>
+          <a:lightRig rig="flat" dir="t"/>
+        </a:scene3d>
+        <a:sp3d prstMaterial="dkEdge">
+          <a:bevelT w="8200" h="38100"/>
+        </a:sp3d>
+      </dsp:spPr>
+      <dsp:style>
+        <a:lnRef idx="0">
+          <a:scrgbClr r="0" g="0" b="0"/>
+        </a:lnRef>
+        <a:fillRef idx="2">
+          <a:scrgbClr r="0" g="0" b="0"/>
+        </a:fillRef>
+        <a:effectRef idx="1">
+          <a:scrgbClr r="0" g="0" b="0"/>
+        </a:effectRef>
+        <a:fontRef idx="minor">
+          <a:schemeClr val="dk1"/>
+        </a:fontRef>
+      </dsp:style>
+      <dsp:txBody>
+        <a:bodyPr spcFirstLastPara="0" vert="horz" wrap="square" lIns="38100" tIns="38100" rIns="38100" bIns="38100" numCol="1" spcCol="1270" anchor="ctr" anchorCtr="0">
+          <a:noAutofit/>
+        </a:bodyPr>
+        <a:lstStyle/>
+        <a:p>
+          <a:pPr marL="0" lvl="0" indent="0" algn="l" defTabSz="444500">
+            <a:lnSpc>
+              <a:spcPct val="90000"/>
+            </a:lnSpc>
+            <a:spcBef>
+              <a:spcPct val="0"/>
+            </a:spcBef>
+            <a:spcAft>
+              <a:spcPct val="35000"/>
+            </a:spcAft>
+            <a:buNone/>
+          </a:pPr>
+          <a:r>
+            <a:rPr lang="en-US" sz="1000" kern="1200" dirty="0"/>
+            <a:t>828 Articles extracted for the month of Sept.1 - Oct5.</a:t>
+          </a:r>
+        </a:p>
+        <a:p>
+          <a:pPr marL="0" lvl="0" indent="0" algn="l" defTabSz="444500">
+            <a:lnSpc>
+              <a:spcPct val="90000"/>
+            </a:lnSpc>
+            <a:spcBef>
+              <a:spcPct val="0"/>
+            </a:spcBef>
+            <a:spcAft>
+              <a:spcPct val="35000"/>
+            </a:spcAft>
+            <a:buNone/>
+          </a:pPr>
+          <a:r>
+            <a:rPr lang="en-US" sz="1000" kern="1200" dirty="0"/>
+            <a:t>544 Articles (66%) had 1 or more Keywords</a:t>
+          </a:r>
+        </a:p>
+        <a:p>
+          <a:pPr marL="0" lvl="0" indent="0" algn="l" defTabSz="444500">
+            <a:lnSpc>
+              <a:spcPct val="90000"/>
+            </a:lnSpc>
+            <a:spcBef>
+              <a:spcPct val="0"/>
+            </a:spcBef>
+            <a:spcAft>
+              <a:spcPct val="35000"/>
+            </a:spcAft>
+            <a:buNone/>
+          </a:pPr>
+          <a:r>
+            <a:rPr lang="en-US" sz="1000" kern="1200" dirty="0"/>
+            <a:t>(34%) of Articles used none</a:t>
+          </a:r>
+        </a:p>
+        <a:p>
+          <a:pPr marL="0" lvl="0" indent="0" algn="l" defTabSz="444500">
+            <a:lnSpc>
+              <a:spcPct val="90000"/>
+            </a:lnSpc>
+            <a:spcBef>
+              <a:spcPct val="0"/>
+            </a:spcBef>
+            <a:spcAft>
+              <a:spcPct val="35000"/>
+            </a:spcAft>
+            <a:buNone/>
+          </a:pPr>
+          <a:r>
+            <a:rPr lang="en-US" sz="1000" kern="1200" dirty="0"/>
+            <a:t>544 Articles used 1657 Unique Keywords with a total usage count of 3356</a:t>
+          </a:r>
+        </a:p>
+        <a:p>
+          <a:pPr marL="0" lvl="0" indent="0" algn="l" defTabSz="444500">
+            <a:lnSpc>
+              <a:spcPct val="90000"/>
+            </a:lnSpc>
+            <a:spcBef>
+              <a:spcPct val="0"/>
+            </a:spcBef>
+            <a:spcAft>
+              <a:spcPct val="35000"/>
+            </a:spcAft>
+            <a:buNone/>
+          </a:pPr>
+          <a:r>
+            <a:rPr lang="en-US" sz="1000" kern="1200" dirty="0"/>
+            <a:t>57 Keywords (3.4%) represented 50% of Keywords used</a:t>
+          </a:r>
+        </a:p>
+        <a:p>
+          <a:pPr marL="0" lvl="0" indent="0" algn="l" defTabSz="444500">
+            <a:lnSpc>
+              <a:spcPct val="90000"/>
+            </a:lnSpc>
+            <a:spcBef>
+              <a:spcPct val="0"/>
+            </a:spcBef>
+            <a:spcAft>
+              <a:spcPct val="35000"/>
+            </a:spcAft>
+            <a:buNone/>
+          </a:pPr>
+          <a:r>
+            <a:rPr lang="en-US" sz="1000" b="1" kern="1200" dirty="0"/>
+            <a:t>Top 25% of Percent of ALL Keyword usage is Represented by just 16 Keywords</a:t>
+          </a:r>
+          <a:endParaRPr lang="en-US" sz="1000" kern="1200" dirty="0"/>
+        </a:p>
+        <a:p>
+          <a:pPr marL="0" lvl="0" indent="0" algn="l" defTabSz="444500">
+            <a:lnSpc>
+              <a:spcPct val="90000"/>
+            </a:lnSpc>
+            <a:spcBef>
+              <a:spcPct val="0"/>
+            </a:spcBef>
+            <a:spcAft>
+              <a:spcPct val="35000"/>
+            </a:spcAft>
+            <a:buNone/>
+          </a:pPr>
+          <a:r>
+            <a:rPr lang="en-US" sz="1000" b="1" kern="1200" dirty="0"/>
+            <a:t>66% of those are about U.S. Politics</a:t>
+          </a:r>
+          <a:endParaRPr lang="en-US" sz="1000" kern="1200" dirty="0"/>
+        </a:p>
+      </dsp:txBody>
+      <dsp:txXfrm>
+        <a:off x="91384" y="132701"/>
+        <a:ext cx="3233627" cy="1689232"/>
+      </dsp:txXfrm>
+    </dsp:sp>
+  </dsp:spTree>
+</dsp:drawing>
+</file>
+
+<file path=ppt/diagrams/layout1.xml><?xml version="1.0" encoding="utf-8"?>
+<dgm:layoutDef xmlns:dgm="http://schemas.openxmlformats.org/drawingml/2006/diagram" xmlns:a="http://schemas.openxmlformats.org/drawingml/2006/main" uniqueId="urn:microsoft.com/office/officeart/2005/8/layout/vList2">
+  <dgm:title val=""/>
+  <dgm:desc val=""/>
+  <dgm:catLst>
+    <dgm:cat type="list" pri="3000"/>
+    <dgm:cat type="convert" pri="1000"/>
+  </dgm:catLst>
+  <dgm:sampData>
+    <dgm:dataModel>
+      <dgm:ptLst>
+        <dgm:pt modelId="0" type="doc"/>
+        <dgm:pt modelId="1">
+          <dgm:prSet phldr="1"/>
+        </dgm:pt>
+        <dgm:pt modelId="11">
+          <dgm:prSet phldr="1"/>
+        </dgm:pt>
+        <dgm:pt modelId="2">
+          <dgm:prSet phldr="1"/>
+        </dgm:pt>
+        <dgm:pt modelId="21">
+          <dgm:prSet phldr="1"/>
+        </dgm:pt>
+      </dgm:ptLst>
+      <dgm:cxnLst>
+        <dgm:cxn modelId="4" srcId="0" destId="1" srcOrd="0" destOrd="0"/>
+        <dgm:cxn modelId="5" srcId="0" destId="2" srcOrd="1" destOrd="0"/>
+        <dgm:cxn modelId="12" srcId="1" destId="11" srcOrd="0" destOrd="0"/>
+        <dgm:cxn modelId="23" srcId="2" destId="21" srcOrd="0" destOrd="0"/>
+      </dgm:cxnLst>
+      <dgm:bg/>
+      <dgm:whole/>
+    </dgm:dataModel>
+  </dgm:sampData>
+  <dgm:styleData>
+    <dgm:dataModel>
+      <dgm:ptLst>
+        <dgm:pt modelId="0" type="doc"/>
+        <dgm:pt modelId="1"/>
+        <dgm:pt modelId="2"/>
+      </dgm:ptLst>
+      <dgm:cxnLst>
+        <dgm:cxn modelId="3" srcId="0" destId="1" srcOrd="0" destOrd="0"/>
+        <dgm:cxn modelId="4" srcId="0" destId="2" srcOrd="1" destOrd="0"/>
+      </dgm:cxnLst>
+      <dgm:bg/>
+      <dgm:whole/>
+    </dgm:dataModel>
+  </dgm:styleData>
+  <dgm:clrData>
+    <dgm:dataModel>
+      <dgm:ptLst>
+        <dgm:pt modelId="0" type="doc"/>
+        <dgm:pt modelId="1"/>
+        <dgm:pt modelId="2"/>
+        <dgm:pt modelId="3"/>
+        <dgm:pt modelId="4"/>
+      </dgm:ptLst>
+      <dgm:cxnLst>
+        <dgm:cxn modelId="5" srcId="0" destId="1" srcOrd="0" destOrd="0"/>
+        <dgm:cxn modelId="6" srcId="0" destId="2" srcOrd="1" destOrd="0"/>
+        <dgm:cxn modelId="7" srcId="0" destId="3" srcOrd="2" destOrd="0"/>
+        <dgm:cxn modelId="8" srcId="0" destId="4" srcOrd="3" destOrd="0"/>
+      </dgm:cxnLst>
+      <dgm:bg/>
+      <dgm:whole/>
+    </dgm:dataModel>
+  </dgm:clrData>
+  <dgm:layoutNode name="linear">
+    <dgm:varLst>
+      <dgm:animLvl val="lvl"/>
+      <dgm:resizeHandles val="exact"/>
+    </dgm:varLst>
+    <dgm:alg type="lin">
+      <dgm:param type="linDir" val="fromT"/>
+      <dgm:param type="vertAlign" val="mid"/>
+    </dgm:alg>
+    <dgm:shape xmlns:r="http://schemas.openxmlformats.org/officeDocument/2006/relationships" r:blip="">
+      <dgm:adjLst/>
+    </dgm:shape>
+    <dgm:presOf/>
+    <dgm:constrLst>
+      <dgm:constr type="w" for="ch" forName="parentText" refType="w"/>
+      <dgm:constr type="h" for="ch" forName="parentText" refType="primFontSz" refFor="ch" refForName="parentText" fact="0.52"/>
+      <dgm:constr type="w" for="ch" forName="childText" refType="w"/>
+      <dgm:constr type="h" for="ch" forName="childText" refType="primFontSz" refFor="ch" refForName="parentText" fact="0.46"/>
+      <dgm:constr type="h" for="ch" forName="parentText" op="equ"/>
+      <dgm:constr type="primFontSz" for="ch" forName="parentText" op="equ" val="65"/>
+      <dgm:constr type="primFontSz" for="ch" forName="childText" refType="primFontSz" refFor="ch" refForName="parentText" op="equ"/>
+      <dgm:constr type="h" for="ch" forName="spacer" refType="primFontSz" refFor="ch" refForName="parentText" fact="0.08"/>
+    </dgm:constrLst>
+    <dgm:ruleLst>
+      <dgm:rule type="primFontSz" for="ch" forName="parentText" val="5" fact="NaN" max="NaN"/>
+    </dgm:ruleLst>
+    <dgm:forEach name="Name0" axis="ch" ptType="node">
+      <dgm:layoutNode name="parentText" styleLbl="node1">
+        <dgm:varLst>
+          <dgm:chMax val="0"/>
+          <dgm:bulletEnabled val="1"/>
+        </dgm:varLst>
+        <dgm:alg type="tx">
+          <dgm:param type="parTxLTRAlign" val="l"/>
+          <dgm:param type="parTxRTLAlign" val="r"/>
+        </dgm:alg>
+        <dgm:shape xmlns:r="http://schemas.openxmlformats.org/officeDocument/2006/relationships" type="roundRect" r:blip="">
+          <dgm:adjLst/>
+        </dgm:shape>
+        <dgm:presOf axis="self"/>
+        <dgm:constrLst>
+          <dgm:constr type="tMarg" refType="primFontSz" fact="0.3"/>
+          <dgm:constr type="bMarg" refType="primFontSz" fact="0.3"/>
+          <dgm:constr type="lMarg" refType="primFontSz" fact="0.3"/>
+          <dgm:constr type="rMarg" refType="primFontSz" fact="0.3"/>
+        </dgm:constrLst>
+        <dgm:ruleLst>
+          <dgm:rule type="h" val="INF" fact="NaN" max="NaN"/>
+        </dgm:ruleLst>
+      </dgm:layoutNode>
+      <dgm:choose name="Name1">
+        <dgm:if name="Name2" axis="ch" ptType="node" func="cnt" op="gte" val="1">
+          <dgm:layoutNode name="childText" styleLbl="revTx">
+            <dgm:varLst>
+              <dgm:bulletEnabled val="1"/>
+            </dgm:varLst>
+            <dgm:alg type="tx">
+              <dgm:param type="stBulletLvl" val="1"/>
+              <dgm:param type="lnSpAfChP" val="20"/>
+            </dgm:alg>
+            <dgm:shape xmlns:r="http://schemas.openxmlformats.org/officeDocument/2006/relationships" type="rect" r:blip="">
+              <dgm:adjLst/>
+            </dgm:shape>
+            <dgm:presOf axis="des" ptType="node"/>
+            <dgm:constrLst>
+              <dgm:constr type="tMarg" refType="primFontSz" fact="0.1"/>
+              <dgm:constr type="bMarg" refType="primFontSz" fact="0.1"/>
+              <dgm:constr type="lMarg" refType="w" fact="0.09"/>
+            </dgm:constrLst>
+            <dgm:ruleLst>
+              <dgm:rule type="h" val="INF" fact="NaN" max="NaN"/>
+            </dgm:ruleLst>
+          </dgm:layoutNode>
+        </dgm:if>
+        <dgm:else name="Name3">
+          <dgm:choose name="Name4">
+            <dgm:if name="Name5" axis="par ch" ptType="doc node" func="cnt" op="gte" val="2">
+              <dgm:forEach name="Name6" axis="followSib" ptType="sibTrans" cnt="1">
+                <dgm:layoutNode name="spacer">
+                  <dgm:alg type="sp"/>
+                  <dgm:shape xmlns:r="http://schemas.openxmlformats.org/officeDocument/2006/relationships" r:blip="">
+                    <dgm:adjLst/>
+                  </dgm:shape>
+                  <dgm:presOf/>
+                  <dgm:constrLst/>
+                  <dgm:ruleLst/>
+                </dgm:layoutNode>
+              </dgm:forEach>
+            </dgm:if>
+            <dgm:else name="Name7"/>
+          </dgm:choose>
+        </dgm:else>
+      </dgm:choose>
+    </dgm:forEach>
+  </dgm:layoutNode>
+</dgm:layoutDef>
+</file>
+
+<file path=ppt/diagrams/quickStyle1.xml><?xml version="1.0" encoding="utf-8"?>
+<dgm:styleDef xmlns:dgm="http://schemas.openxmlformats.org/drawingml/2006/diagram" xmlns:a="http://schemas.openxmlformats.org/drawingml/2006/main" uniqueId="urn:microsoft.com/office/officeart/2005/8/quickstyle/simple3">
+  <dgm:title val=""/>
+  <dgm:desc val=""/>
+  <dgm:catLst>
+    <dgm:cat type="simple" pri="10300"/>
+  </dgm:catLst>
+  <dgm:scene3d>
+    <a:camera prst="orthographicFront"/>
+    <a:lightRig rig="threePt" dir="t"/>
+  </dgm:scene3d>
+  <dgm:styleLbl name="node0">
+    <dgm:scene3d>
+      <a:camera prst="orthographicFront"/>
+      <a:lightRig rig="flat" dir="t"/>
+    </dgm:scene3d>
+    <dgm:sp3d prstMaterial="dkEdge">
+      <a:bevelT w="8200" h="38100"/>
+    </dgm:sp3d>
+    <dgm:txPr/>
+    <dgm:style>
+      <a:lnRef idx="0">
+        <a:scrgbClr r="0" g="0" b="0"/>
+      </a:lnRef>
+      <a:fillRef idx="2">
+        <a:scrgbClr r="0" g="0" b="0"/>
+      </a:fillRef>
+      <a:effectRef idx="1">
+        <a:scrgbClr r="0" g="0" b="0"/>
+      </a:effectRef>
+      <a:fontRef idx="minor">
+        <a:schemeClr val="dk1"/>
+      </a:fontRef>
+    </dgm:style>
+  </dgm:styleLbl>
+  <dgm:styleLbl name="lnNode1">
+    <dgm:scene3d>
+      <a:camera prst="orthographicFront"/>
+      <a:lightRig rig="flat" dir="t"/>
+    </dgm:scene3d>
+    <dgm:sp3d prstMaterial="dkEdge">
+      <a:bevelT w="8200" h="38100"/>
+    </dgm:sp3d>
+    <dgm:txPr/>
+    <dgm:style>
+      <a:lnRef idx="1">
+        <a:scrgbClr r="0" g="0" b="0"/>
+      </a:lnRef>
+      <a:fillRef idx="2">
+        <a:scrgbClr r="0" g="0" b="0"/>
+      </a:fillRef>
+      <a:effectRef idx="0">
+        <a:scrgbClr r="0" g="0" b="0"/>
+      </a:effectRef>
+      <a:fontRef idx="minor">
+        <a:schemeClr val="dk1"/>
+      </a:fontRef>
+    </dgm:style>
+  </dgm:styleLbl>
+  <dgm:styleLbl name="vennNode1">
+    <dgm:scene3d>
+      <a:camera prst="orthographicFront"/>
+      <a:lightRig rig="flat" dir="t"/>
+    </dgm:scene3d>
+    <dgm:sp3d prstMaterial="dkEdge">
+      <a:bevelT w="8200" h="38100"/>
+    </dgm:sp3d>
+    <dgm:txPr/>
+    <dgm:style>
+      <a:lnRef idx="0">
+        <a:scrgbClr r="0" g="0" b="0"/>
+      </a:lnRef>
+      <a:fillRef idx="2">
+        <a:scrgbClr r="0" g="0" b="0"/>
+      </a:fillRef>
+      <a:effectRef idx="0">
+        <a:scrgbClr r="0" g="0" b="0"/>
+      </a:effectRef>
+      <a:fontRef idx="minor">
+        <a:schemeClr val="tx1"/>
+      </a:fontRef>
+    </dgm:style>
+  </dgm:styleLbl>
+  <dgm:styleLbl name="alignNode1">
+    <dgm:scene3d>
+      <a:camera prst="orthographicFront"/>
+      <a:lightRig rig="threePt" dir="t"/>
+    </dgm:scene3d>
+    <dgm:sp3d/>
+    <dgm:txPr/>
+    <dgm:style>
+      <a:lnRef idx="1">
+        <a:scrgbClr r="0" g="0" b="0"/>
+      </a:lnRef>
+      <a:fillRef idx="2">
+        <a:scrgbClr r="0" g="0" b="0"/>
+      </a:fillRef>
+      <a:effectRef idx="1">
+        <a:scrgbClr r="0" g="0" b="0"/>
+      </a:effectRef>
+      <a:fontRef idx="minor">
+        <a:schemeClr val="dk1"/>
+      </a:fontRef>
+    </dgm:style>
+  </dgm:styleLbl>
+  <dgm:styleLbl name="node1">
+    <dgm:scene3d>
+      <a:camera prst="orthographicFront"/>
+      <a:lightRig rig="flat" dir="t"/>
+    </dgm:scene3d>
+    <dgm:sp3d prstMaterial="dkEdge">
+      <a:bevelT w="8200" h="38100"/>
+    </dgm:sp3d>
+    <dgm:txPr/>
+    <dgm:style>
+      <a:lnRef idx="0">
+        <a:scrgbClr r="0" g="0" b="0"/>
+      </a:lnRef>
+      <a:fillRef idx="2">
+        <a:scrgbClr r="0" g="0" b="0"/>
+      </a:fillRef>
+      <a:effectRef idx="1">
+        <a:scrgbClr r="0" g="0" b="0"/>
+      </a:effectRef>
+      <a:fontRef idx="minor">
+        <a:schemeClr val="dk1"/>
+      </a:fontRef>
+    </dgm:style>
+  </dgm:styleLbl>
+  <dgm:styleLbl name="node2">
+    <dgm:scene3d>
+      <a:camera prst="orthographicFront"/>
+      <a:lightRig rig="flat" dir="t"/>
+    </dgm:scene3d>
+    <dgm:sp3d prstMaterial="dkEdge">
+      <a:bevelT w="8200" h="38100"/>
+    </dgm:sp3d>
+    <dgm:txPr/>
+    <dgm:style>
+      <a:lnRef idx="0">
+        <a:scrgbClr r="0" g="0" b="0"/>
+      </a:lnRef>
+      <a:fillRef idx="2">
+        <a:scrgbClr r="0" g="0" b="0"/>
+      </a:fillRef>
+      <a:effectRef idx="1">
+        <a:scrgbClr r="0" g="0" b="0"/>
+      </a:effectRef>
+      <a:fontRef idx="minor">
+        <a:schemeClr val="dk1"/>
+      </a:fontRef>
+    </dgm:style>
+  </dgm:styleLbl>
+  <dgm:styleLbl name="node3">
+    <dgm:scene3d>
+      <a:camera prst="orthographicFront"/>
+      <a:lightRig rig="flat" dir="t"/>
+    </dgm:scene3d>
+    <dgm:sp3d prstMaterial="dkEdge">
+      <a:bevelT w="8200" h="38100"/>
+    </dgm:sp3d>
+    <dgm:txPr/>
+    <dgm:style>
+      <a:lnRef idx="0">
+        <a:scrgbClr r="0" g="0" b="0"/>
+      </a:lnRef>
+      <a:fillRef idx="2">
+        <a:scrgbClr r="0" g="0" b="0"/>
+      </a:fillRef>
+      <a:effectRef idx="1">
+        <a:scrgbClr r="0" g="0" b="0"/>
+      </a:effectRef>
+      <a:fontRef idx="minor">
+        <a:schemeClr val="dk1"/>
+      </a:fontRef>
+    </dgm:style>
+  </dgm:styleLbl>
+  <dgm:styleLbl name="node4">
+    <dgm:scene3d>
+      <a:camera prst="orthographicFront"/>
+      <a:lightRig rig="flat" dir="t"/>
+    </dgm:scene3d>
+    <dgm:sp3d prstMaterial="dkEdge">
+      <a:bevelT w="8200" h="38100"/>
+    </dgm:sp3d>
+    <dgm:txPr/>
+    <dgm:style>
+      <a:lnRef idx="0">
+        <a:scrgbClr r="0" g="0" b="0"/>
+      </a:lnRef>
+      <a:fillRef idx="2">
+        <a:scrgbClr r="0" g="0" b="0"/>
+      </a:fillRef>
+      <a:effectRef idx="1">
+        <a:scrgbClr r="0" g="0" b="0"/>
+      </a:effectRef>
+      <a:fontRef idx="minor">
+        <a:schemeClr val="dk1"/>
+      </a:fontRef>
+    </dgm:style>
+  </dgm:styleLbl>
+  <dgm:styleLbl name="fgImgPlace1">
+    <dgm:scene3d>
+      <a:camera prst="orthographicFront"/>
+      <a:lightRig rig="threePt" dir="t"/>
+    </dgm:scene3d>
+    <dgm:sp3d/>
+    <dgm:txPr/>
+    <dgm:style>
+      <a:lnRef idx="1">
+        <a:scrgbClr r="0" g="0" b="0"/>
+      </a:lnRef>
+      <a:fillRef idx="1">
+        <a:scrgbClr r="0" g="0" b="0"/>
+      </a:fillRef>
+      <a:effectRef idx="1">
+        <a:scrgbClr r="0" g="0" b="0"/>
+      </a:effectRef>
+      <a:fontRef idx="minor"/>
+    </dgm:style>
+  </dgm:styleLbl>
+  <dgm:styleLbl name="alignImgPlace1">
+    <dgm:scene3d>
+      <a:camera prst="orthographicFront"/>
+      <a:lightRig rig="threePt" dir="t"/>
+    </dgm:scene3d>
+    <dgm:sp3d/>
+    <dgm:txPr/>
+    <dgm:style>
+      <a:lnRef idx="1">
+        <a:scrgbClr r="0" g="0" b="0"/>
+      </a:lnRef>
+      <a:fillRef idx="1">
+        <a:scrgbClr r="0" g="0" b="0"/>
+      </a:fillRef>
+      <a:effectRef idx="1">
+        <a:scrgbClr r="0" g="0" b="0"/>
+      </a:effectRef>
+      <a:fontRef idx="minor"/>
+    </dgm:style>
+  </dgm:styleLbl>
+  <dgm:styleLbl name="bgImgPlace1">
+    <dgm:scene3d>
+      <a:camera prst="orthographicFront"/>
+      <a:lightRig rig="threePt" dir="t"/>
+    </dgm:scene3d>
+    <dgm:sp3d/>
+    <dgm:txPr/>
+    <dgm:style>
+      <a:lnRef idx="1">
+        <a:scrgbClr r="0" g="0" b="0"/>
+      </a:lnRef>
+      <a:fillRef idx="1">
+        <a:scrgbClr r="0" g="0" b="0"/>
+      </a:fillRef>
+      <a:effectRef idx="1">
+        <a:scrgbClr r="0" g="0" b="0"/>
+      </a:effectRef>
+      <a:fontRef idx="minor"/>
+    </dgm:style>
+  </dgm:styleLbl>
+  <dgm:styleLbl name="sibTrans2D1">
+    <dgm:scene3d>
+      <a:camera prst="orthographicFront"/>
+      <a:lightRig rig="threePt" dir="t"/>
+    </dgm:scene3d>
+    <dgm:sp3d/>
+    <dgm:txPr/>
+    <dgm:style>
+      <a:lnRef idx="0">
+        <a:scrgbClr r="0" g="0" b="0"/>
+      </a:lnRef>
+      <a:fillRef idx="2">
+        <a:scrgbClr r="0" g="0" b="0"/>
+      </a:fillRef>
+      <a:effectRef idx="1">
+        <a:scrgbClr r="0" g="0" b="0"/>
+      </a:effectRef>
+      <a:fontRef idx="minor">
+        <a:schemeClr val="dk1"/>
+      </a:fontRef>
+    </dgm:style>
+  </dgm:styleLbl>
+  <dgm:styleLbl name="fgSibTrans2D1">
+    <dgm:scene3d>
+      <a:camera prst="orthographicFront"/>
+      <a:lightRig rig="threePt" dir="t"/>
+    </dgm:scene3d>
+    <dgm:sp3d/>
+    <dgm:txPr/>
+    <dgm:style>
+      <a:lnRef idx="0">
+        <a:scrgbClr r="0" g="0" b="0"/>
+      </a:lnRef>
+      <a:fillRef idx="2">
+        <a:scrgbClr r="0" g="0" b="0"/>
+      </a:fillRef>
+      <a:effectRef idx="1">
+        <a:scrgbClr r="0" g="0" b="0"/>
+      </a:effectRef>
+      <a:fontRef idx="minor">
+        <a:schemeClr val="dk1"/>
+      </a:fontRef>
+    </dgm:style>
+  </dgm:styleLbl>
+  <dgm:styleLbl name="bgSibTrans2D1">
+    <dgm:scene3d>
+      <a:camera prst="orthographicFront"/>
+      <a:lightRig rig="threePt" dir="t"/>
+    </dgm:scene3d>
+    <dgm:sp3d/>
+    <dgm:txPr/>
+    <dgm:style>
+      <a:lnRef idx="0">
+        <a:scrgbClr r="0" g="0" b="0"/>
+      </a:lnRef>
+      <a:fillRef idx="2">
+        <a:scrgbClr r="0" g="0" b="0"/>
+      </a:fillRef>
+      <a:effectRef idx="1">
+        <a:scrgbClr r="0" g="0" b="0"/>
+      </a:effectRef>
+      <a:fontRef idx="minor">
+        <a:schemeClr val="dk1"/>
+      </a:fontRef>
+    </dgm:style>
+  </dgm:styleLbl>
+  <dgm:styleLbl name="sibTrans1D1">
+    <dgm:scene3d>
+      <a:camera prst="orthographicFront"/>
+      <a:lightRig rig="threePt" dir="t"/>
+    </dgm:scene3d>
+    <dgm:sp3d/>
+    <dgm:txPr/>
+    <dgm:style>
+      <a:lnRef idx="1">
+        <a:scrgbClr r="0" g="0" b="0"/>
+      </a:lnRef>
+      <a:fillRef idx="0">
+        <a:scrgbClr r="0" g="0" b="0"/>
+      </a:fillRef>
+      <a:effectRef idx="0">
+        <a:scrgbClr r="0" g="0" b="0"/>
+      </a:effectRef>
+      <a:fontRef idx="minor"/>
+    </dgm:style>
+  </dgm:styleLbl>
+  <dgm:styleLbl name="callout">
+    <dgm:scene3d>
+      <a:camera prst="orthographicFront"/>
+      <a:lightRig rig="threePt" dir="t"/>
+    </dgm:scene3d>
+    <dgm:sp3d/>
+    <dgm:txPr/>
+    <dgm:style>
+      <a:lnRef idx="1">
+        <a:scrgbClr r="0" g="0" b="0"/>
+      </a:lnRef>
+      <a:fillRef idx="2">
+        <a:scrgbClr r="0" g="0" b="0"/>
+      </a:fillRef>
+      <a:effectRef idx="1">
+        <a:scrgbClr r="0" g="0" b="0"/>
+      </a:effectRef>
+      <a:fontRef idx="minor"/>
+    </dgm:style>
+  </dgm:styleLbl>
+  <dgm:styleLbl name="asst0">
+    <dgm:scene3d>
+      <a:camera prst="orthographicFront"/>
+      <a:lightRig rig="flat" dir="t"/>
+    </dgm:scene3d>
+    <dgm:sp3d prstMaterial="dkEdge">
+      <a:bevelT w="8200" h="38100"/>
+    </dgm:sp3d>
+    <dgm:txPr/>
+    <dgm:style>
+      <a:lnRef idx="0">
+        <a:scrgbClr r="0" g="0" b="0"/>
+      </a:lnRef>
+      <a:fillRef idx="2">
+        <a:scrgbClr r="0" g="0" b="0"/>
+      </a:fillRef>
+      <a:effectRef idx="1">
+        <a:scrgbClr r="0" g="0" b="0"/>
+      </a:effectRef>
+      <a:fontRef idx="minor">
+        <a:schemeClr val="dk1"/>
+      </a:fontRef>
+    </dgm:style>
+  </dgm:styleLbl>
+  <dgm:styleLbl name="asst1">
+    <dgm:scene3d>
+      <a:camera prst="orthographicFront"/>
+      <a:lightRig rig="flat" dir="t"/>
+    </dgm:scene3d>
+    <dgm:sp3d prstMaterial="dkEdge">
+      <a:bevelT w="8200" h="38100"/>
+    </dgm:sp3d>
+    <dgm:txPr/>
+    <dgm:style>
+      <a:lnRef idx="0">
+        <a:scrgbClr r="0" g="0" b="0"/>
+      </a:lnRef>
+      <a:fillRef idx="2">
+        <a:scrgbClr r="0" g="0" b="0"/>
+      </a:fillRef>
+      <a:effectRef idx="1">
+        <a:scrgbClr r="0" g="0" b="0"/>
+      </a:effectRef>
+      <a:fontRef idx="minor">
+        <a:schemeClr val="dk1"/>
+      </a:fontRef>
+    </dgm:style>
+  </dgm:styleLbl>
+  <dgm:styleLbl name="asst2">
+    <dgm:scene3d>
+      <a:camera prst="orthographicFront"/>
+      <a:lightRig rig="flat" dir="t"/>
+    </dgm:scene3d>
+    <dgm:sp3d prstMaterial="dkEdge">
+      <a:bevelT w="8200" h="38100"/>
+    </dgm:sp3d>
+    <dgm:txPr/>
+    <dgm:style>
+      <a:lnRef idx="0">
+        <a:scrgbClr r="0" g="0" b="0"/>
+      </a:lnRef>
+      <a:fillRef idx="2">
+        <a:scrgbClr r="0" g="0" b="0"/>
+      </a:fillRef>
+      <a:effectRef idx="1">
+        <a:scrgbClr r="0" g="0" b="0"/>
+      </a:effectRef>
+      <a:fontRef idx="minor">
+        <a:schemeClr val="dk1"/>
+      </a:fontRef>
+    </dgm:style>
+  </dgm:styleLbl>
+  <dgm:styleLbl name="asst3">
+    <dgm:scene3d>
+      <a:camera prst="orthographicFront"/>
+      <a:lightRig rig="flat" dir="t"/>
+    </dgm:scene3d>
+    <dgm:sp3d prstMaterial="dkEdge">
+      <a:bevelT w="8200" h="38100"/>
+    </dgm:sp3d>
+    <dgm:txPr/>
+    <dgm:style>
+      <a:lnRef idx="0">
+        <a:scrgbClr r="0" g="0" b="0"/>
+      </a:lnRef>
+      <a:fillRef idx="2">
+        <a:scrgbClr r="0" g="0" b="0"/>
+      </a:fillRef>
+      <a:effectRef idx="1">
+        <a:scrgbClr r="0" g="0" b="0"/>
+      </a:effectRef>
+      <a:fontRef idx="minor">
+        <a:schemeClr val="dk1"/>
+      </a:fontRef>
+    </dgm:style>
+  </dgm:styleLbl>
+  <dgm:styleLbl name="asst4">
+    <dgm:scene3d>
+      <a:camera prst="orthographicFront"/>
+      <a:lightRig rig="flat" dir="t"/>
+    </dgm:scene3d>
+    <dgm:sp3d prstMaterial="dkEdge">
+      <a:bevelT w="8200" h="38100"/>
+    </dgm:sp3d>
+    <dgm:txPr/>
+    <dgm:style>
+      <a:lnRef idx="0">
+        <a:scrgbClr r="0" g="0" b="0"/>
+      </a:lnRef>
+      <a:fillRef idx="2">
+        <a:scrgbClr r="0" g="0" b="0"/>
+      </a:fillRef>
+      <a:effectRef idx="1">
+        <a:scrgbClr r="0" g="0" b="0"/>
+      </a:effectRef>
+      <a:fontRef idx="minor">
+        <a:schemeClr val="dk1"/>
+      </a:fontRef>
+    </dgm:style>
+  </dgm:styleLbl>
+  <dgm:styleLbl name="parChTrans2D1">
+    <dgm:scene3d>
+      <a:camera prst="orthographicFront"/>
+      <a:lightRig rig="threePt" dir="t"/>
+    </dgm:scene3d>
+    <dgm:sp3d/>
+    <dgm:txPr/>
+    <dgm:style>
+      <a:lnRef idx="1">
+        <a:scrgbClr r="0" g="0" b="0"/>
+      </a:lnRef>
+      <a:fillRef idx="2">
+        <a:scrgbClr r="0" g="0" b="0"/>
+      </a:fillRef>
+      <a:effectRef idx="1">
+        <a:scrgbClr r="0" g="0" b="0"/>
+      </a:effectRef>
+      <a:fontRef idx="minor">
+        <a:schemeClr val="dk1"/>
+      </a:fontRef>
+    </dgm:style>
+  </dgm:styleLbl>
+  <dgm:styleLbl name="parChTrans2D2">
+    <dgm:scene3d>
+      <a:camera prst="orthographicFront"/>
+      <a:lightRig rig="threePt" dir="t"/>
+    </dgm:scene3d>
+    <dgm:sp3d/>
+    <dgm:txPr/>
+    <dgm:style>
+      <a:lnRef idx="1">
+        <a:scrgbClr r="0" g="0" b="0"/>
+      </a:lnRef>
+      <a:fillRef idx="2">
+        <a:scrgbClr r="0" g="0" b="0"/>
+      </a:fillRef>
+      <a:effectRef idx="1">
+        <a:scrgbClr r="0" g="0" b="0"/>
+      </a:effectRef>
+      <a:fontRef idx="minor">
+        <a:schemeClr val="dk1"/>
+      </a:fontRef>
+    </dgm:style>
+  </dgm:styleLbl>
+  <dgm:styleLbl name="parChTrans2D3">
+    <dgm:scene3d>
+      <a:camera prst="orthographicFront"/>
+      <a:lightRig rig="threePt" dir="t"/>
+    </dgm:scene3d>
+    <dgm:sp3d/>
+    <dgm:txPr/>
+    <dgm:style>
+      <a:lnRef idx="1">
+        <a:scrgbClr r="0" g="0" b="0"/>
+      </a:lnRef>
+      <a:fillRef idx="2">
+        <a:scrgbClr r="0" g="0" b="0"/>
+      </a:fillRef>
+      <a:effectRef idx="1">
+        <a:scrgbClr r="0" g="0" b="0"/>
+      </a:effectRef>
+      <a:fontRef idx="minor">
+        <a:schemeClr val="dk1"/>
+      </a:fontRef>
+    </dgm:style>
+  </dgm:styleLbl>
+  <dgm:styleLbl name="parChTrans2D4">
+    <dgm:scene3d>
+      <a:camera prst="orthographicFront"/>
+      <a:lightRig rig="threePt" dir="t"/>
+    </dgm:scene3d>
+    <dgm:sp3d/>
+    <dgm:txPr/>
+    <dgm:style>
+      <a:lnRef idx="1">
+        <a:scrgbClr r="0" g="0" b="0"/>
+      </a:lnRef>
+      <a:fillRef idx="2">
+        <a:scrgbClr r="0" g="0" b="0"/>
+      </a:fillRef>
+      <a:effectRef idx="1">
+        <a:scrgbClr r="0" g="0" b="0"/>
+      </a:effectRef>
+      <a:fontRef idx="minor">
+        <a:schemeClr val="dk1"/>
+      </a:fontRef>
+    </dgm:style>
+  </dgm:styleLbl>
+  <dgm:styleLbl name="parChTrans1D1">
+    <dgm:scene3d>
+      <a:camera prst="orthographicFront"/>
+      <a:lightRig rig="threePt" dir="t"/>
+    </dgm:scene3d>
+    <dgm:sp3d/>
+    <dgm:txPr/>
+    <dgm:style>
+      <a:lnRef idx="2">
+        <a:scrgbClr r="0" g="0" b="0"/>
+      </a:lnRef>
+      <a:fillRef idx="0">
+        <a:scrgbClr r="0" g="0" b="0"/>
+      </a:fillRef>
+      <a:effectRef idx="0">
+        <a:scrgbClr r="0" g="0" b="0"/>
+      </a:effectRef>
+      <a:fontRef idx="minor"/>
+    </dgm:style>
+  </dgm:styleLbl>
+  <dgm:styleLbl name="parChTrans1D2">
+    <dgm:scene3d>
+      <a:camera prst="orthographicFront"/>
+      <a:lightRig rig="threePt" dir="t"/>
+    </dgm:scene3d>
+    <dgm:sp3d/>
+    <dgm:txPr/>
+    <dgm:style>
+      <a:lnRef idx="2">
+        <a:scrgbClr r="0" g="0" b="0"/>
+      </a:lnRef>
+      <a:fillRef idx="0">
+        <a:scrgbClr r="0" g="0" b="0"/>
+      </a:fillRef>
+      <a:effectRef idx="0">
+        <a:scrgbClr r="0" g="0" b="0"/>
+      </a:effectRef>
+      <a:fontRef idx="minor"/>
+    </dgm:style>
+  </dgm:styleLbl>
+  <dgm:styleLbl name="parChTrans1D3">
+    <dgm:scene3d>
+      <a:camera prst="orthographicFront"/>
+      <a:lightRig rig="threePt" dir="t"/>
+    </dgm:scene3d>
+    <dgm:sp3d/>
+    <dgm:txPr/>
+    <dgm:style>
+      <a:lnRef idx="2">
+        <a:scrgbClr r="0" g="0" b="0"/>
+      </a:lnRef>
+      <a:fillRef idx="0">
+        <a:scrgbClr r="0" g="0" b="0"/>
+      </a:fillRef>
+      <a:effectRef idx="0">
+        <a:scrgbClr r="0" g="0" b="0"/>
+      </a:effectRef>
+      <a:fontRef idx="minor"/>
+    </dgm:style>
+  </dgm:styleLbl>
+  <dgm:styleLbl name="parChTrans1D4">
+    <dgm:scene3d>
+      <a:camera prst="orthographicFront"/>
+      <a:lightRig rig="threePt" dir="t"/>
+    </dgm:scene3d>
+    <dgm:sp3d/>
+    <dgm:txPr/>
+    <dgm:style>
+      <a:lnRef idx="2">
+        <a:scrgbClr r="0" g="0" b="0"/>
+      </a:lnRef>
+      <a:fillRef idx="0">
+        <a:scrgbClr r="0" g="0" b="0"/>
+      </a:fillRef>
+      <a:effectRef idx="0">
+        <a:scrgbClr r="0" g="0" b="0"/>
+      </a:effectRef>
+      <a:fontRef idx="minor"/>
+    </dgm:style>
+  </dgm:styleLbl>
+  <dgm:styleLbl name="fgAcc1">
+    <dgm:scene3d>
+      <a:camera prst="orthographicFront"/>
+      <a:lightRig rig="threePt" dir="t"/>
+    </dgm:scene3d>
+    <dgm:sp3d/>
+    <dgm:txPr/>
+    <dgm:style>
+      <a:lnRef idx="1">
+        <a:scrgbClr r="0" g="0" b="0"/>
+      </a:lnRef>
+      <a:fillRef idx="1">
+        <a:scrgbClr r="0" g="0" b="0"/>
+      </a:fillRef>
+      <a:effectRef idx="0">
+        <a:scrgbClr r="0" g="0" b="0"/>
+      </a:effectRef>
+      <a:fontRef idx="minor"/>
+    </dgm:style>
+  </dgm:styleLbl>
+  <dgm:styleLbl name="conFgAcc1">
+    <dgm:scene3d>
+      <a:camera prst="orthographicFront"/>
+      <a:lightRig rig="threePt" dir="t"/>
+    </dgm:scene3d>
+    <dgm:sp3d/>
+    <dgm:txPr/>
+    <dgm:style>
+      <a:lnRef idx="1">
+        <a:scrgbClr r="0" g="0" b="0"/>
+      </a:lnRef>
+      <a:fillRef idx="1">
+        <a:scrgbClr r="0" g="0" b="0"/>
+      </a:fillRef>
+      <a:effectRef idx="0">
+        <a:scrgbClr r="0" g="0" b="0"/>
+      </a:effectRef>
+      <a:fontRef idx="minor"/>
+    </dgm:style>
+  </dgm:styleLbl>
+  <dgm:styleLbl name="alignAcc1">
+    <dgm:scene3d>
+      <a:camera prst="orthographicFront"/>
+      <a:lightRig rig="threePt" dir="t"/>
+    </dgm:scene3d>
+    <dgm:sp3d/>
+    <dgm:txPr/>
+    <dgm:style>
+      <a:lnRef idx="1">
+        <a:scrgbClr r="0" g="0" b="0"/>
+      </a:lnRef>
+      <a:fillRef idx="1">
+        <a:scrgbClr r="0" g="0" b="0"/>
+      </a:fillRef>
+      <a:effectRef idx="0">
+        <a:scrgbClr r="0" g="0" b="0"/>
+      </a:effectRef>
+      <a:fontRef idx="minor"/>
+    </dgm:style>
+  </dgm:styleLbl>
+  <dgm:styleLbl name="trAlignAcc1">
+    <dgm:scene3d>
+      <a:camera prst="orthographicFront"/>
+      <a:lightRig rig="threePt" dir="t"/>
+    </dgm:scene3d>
+    <dgm:sp3d/>
+    <dgm:txPr/>
+    <dgm:style>
+      <a:lnRef idx="1">
+        <a:scrgbClr r="0" g="0" b="0"/>
+      </a:lnRef>
+      <a:fillRef idx="1">
+        <a:scrgbClr r="0" g="0" b="0"/>
+      </a:fillRef>
+      <a:effectRef idx="0">
+        <a:scrgbClr r="0" g="0" b="0"/>
+      </a:effectRef>
+      <a:fontRef idx="minor"/>
+    </dgm:style>
+  </dgm:styleLbl>
+  <dgm:styleLbl name="bgAcc1">
+    <dgm:scene3d>
+      <a:camera prst="orthographicFront"/>
+      <a:lightRig rig="threePt" dir="t"/>
+    </dgm:scene3d>
+    <dgm:sp3d/>
+    <dgm:txPr/>
+    <dgm:style>
+      <a:lnRef idx="1">
+        <a:scrgbClr r="0" g="0" b="0"/>
+      </a:lnRef>
+      <a:fillRef idx="1">
+        <a:scrgbClr r="0" g="0" b="0"/>
+      </a:fillRef>
+      <a:effectRef idx="0">
+        <a:scrgbClr r="0" g="0" b="0"/>
+      </a:effectRef>
+      <a:fontRef idx="minor"/>
+    </dgm:style>
+  </dgm:styleLbl>
+  <dgm:styleLbl name="solidFgAcc1">
+    <dgm:scene3d>
+      <a:camera prst="orthographicFront"/>
+      <a:lightRig rig="threePt" dir="t"/>
+    </dgm:scene3d>
+    <dgm:sp3d/>
+    <dgm:txPr/>
+    <dgm:style>
+      <a:lnRef idx="1">
+        <a:scrgbClr r="0" g="0" b="0"/>
+      </a:lnRef>
+      <a:fillRef idx="2">
+        <a:scrgbClr r="0" g="0" b="0"/>
+      </a:fillRef>
+      <a:effectRef idx="0">
+        <a:scrgbClr r="0" g="0" b="0"/>
+      </a:effectRef>
+      <a:fontRef idx="minor"/>
+    </dgm:style>
+  </dgm:styleLbl>
+  <dgm:styleLbl name="solidAlignAcc1">
+    <dgm:scene3d>
+      <a:camera prst="orthographicFront"/>
+      <a:lightRig rig="threePt" dir="t"/>
+    </dgm:scene3d>
+    <dgm:sp3d/>
+    <dgm:txPr/>
+    <dgm:style>
+      <a:lnRef idx="1">
+        <a:scrgbClr r="0" g="0" b="0"/>
+      </a:lnRef>
+      <a:fillRef idx="1">
+        <a:scrgbClr r="0" g="0" b="0"/>
+      </a:fillRef>
+      <a:effectRef idx="0">
+        <a:scrgbClr r="0" g="0" b="0"/>
+      </a:effectRef>
+      <a:fontRef idx="minor"/>
+    </dgm:style>
+  </dgm:styleLbl>
+  <dgm:styleLbl name="solidBgAcc1">
+    <dgm:scene3d>
+      <a:camera prst="orthographicFront"/>
+      <a:lightRig rig="threePt" dir="t"/>
+    </dgm:scene3d>
+    <dgm:sp3d/>
+    <dgm:txPr/>
+    <dgm:style>
+      <a:lnRef idx="1">
+        <a:scrgbClr r="0" g="0" b="0"/>
+      </a:lnRef>
+      <a:fillRef idx="1">
+        <a:scrgbClr r="0" g="0" b="0"/>
+      </a:fillRef>
+      <a:effectRef idx="0">
+        <a:scrgbClr r="0" g="0" b="0"/>
+      </a:effectRef>
+      <a:fontRef idx="minor"/>
+    </dgm:style>
+  </dgm:styleLbl>
+  <dgm:styleLbl name="fgAccFollowNode1">
+    <dgm:scene3d>
+      <a:camera prst="orthographicFront"/>
+      <a:lightRig rig="threePt" dir="t"/>
+    </dgm:scene3d>
+    <dgm:sp3d/>
+    <dgm:txPr/>
+    <dgm:style>
+      <a:lnRef idx="1">
+        <a:scrgbClr r="0" g="0" b="0"/>
+      </a:lnRef>
+      <a:fillRef idx="1">
+        <a:scrgbClr r="0" g="0" b="0"/>
+      </a:fillRef>
+      <a:effectRef idx="0">
+        <a:scrgbClr r="0" g="0" b="0"/>
+      </a:effectRef>
+      <a:fontRef idx="minor"/>
+    </dgm:style>
+  </dgm:styleLbl>
+  <dgm:styleLbl name="alignAccFollowNode1">
+    <dgm:scene3d>
+      <a:camera prst="orthographicFront"/>
+      <a:lightRig rig="threePt" dir="t"/>
+    </dgm:scene3d>
+    <dgm:sp3d/>
+    <dgm:txPr/>
+    <dgm:style>
+      <a:lnRef idx="1">
+        <a:scrgbClr r="0" g="0" b="0"/>
+      </a:lnRef>
+      <a:fillRef idx="1">
+        <a:scrgbClr r="0" g="0" b="0"/>
+      </a:fillRef>
+      <a:effectRef idx="0">
+        <a:scrgbClr r="0" g="0" b="0"/>
+      </a:effectRef>
+      <a:fontRef idx="minor"/>
+    </dgm:style>
+  </dgm:styleLbl>
+  <dgm:styleLbl name="bgAccFollowNode1">
+    <dgm:scene3d>
+      <a:camera prst="orthographicFront"/>
+      <a:lightRig rig="threePt" dir="t"/>
+    </dgm:scene3d>
+    <dgm:sp3d/>
+    <dgm:txPr/>
+    <dgm:style>
+      <a:lnRef idx="1">
+        <a:scrgbClr r="0" g="0" b="0"/>
+      </a:lnRef>
+      <a:fillRef idx="1">
+        <a:scrgbClr r="0" g="0" b="0"/>
+      </a:fillRef>
+      <a:effectRef idx="0">
+        <a:scrgbClr r="0" g="0" b="0"/>
+      </a:effectRef>
+      <a:fontRef idx="minor"/>
+    </dgm:style>
+  </dgm:styleLbl>
+  <dgm:styleLbl name="fgAcc0">
+    <dgm:scene3d>
+      <a:camera prst="orthographicFront"/>
+      <a:lightRig rig="threePt" dir="t"/>
+    </dgm:scene3d>
+    <dgm:sp3d/>
+    <dgm:txPr/>
+    <dgm:style>
+      <a:lnRef idx="1">
+        <a:scrgbClr r="0" g="0" b="0"/>
+      </a:lnRef>
+      <a:fillRef idx="1">
+        <a:scrgbClr r="0" g="0" b="0"/>
+      </a:fillRef>
+      <a:effectRef idx="0">
+        <a:scrgbClr r="0" g="0" b="0"/>
+      </a:effectRef>
+      <a:fontRef idx="minor"/>
+    </dgm:style>
+  </dgm:styleLbl>
+  <dgm:styleLbl name="fgAcc2">
+    <dgm:scene3d>
+      <a:camera prst="orthographicFront"/>
+      <a:lightRig rig="threePt" dir="t"/>
+    </dgm:scene3d>
+    <dgm:sp3d/>
+    <dgm:txPr/>
+    <dgm:style>
+      <a:lnRef idx="1">
+        <a:scrgbClr r="0" g="0" b="0"/>
+      </a:lnRef>
+      <a:fillRef idx="1">
+        <a:scrgbClr r="0" g="0" b="0"/>
+      </a:fillRef>
+      <a:effectRef idx="0">
+        <a:scrgbClr r="0" g="0" b="0"/>
+      </a:effectRef>
+      <a:fontRef idx="minor"/>
+    </dgm:style>
+  </dgm:styleLbl>
+  <dgm:styleLbl name="fgAcc3">
+    <dgm:scene3d>
+      <a:camera prst="orthographicFront"/>
+      <a:lightRig rig="threePt" dir="t"/>
+    </dgm:scene3d>
+    <dgm:sp3d/>
+    <dgm:txPr/>
+    <dgm:style>
+      <a:lnRef idx="1">
+        <a:scrgbClr r="0" g="0" b="0"/>
+      </a:lnRef>
+      <a:fillRef idx="1">
+        <a:scrgbClr r="0" g="0" b="0"/>
+      </a:fillRef>
+      <a:effectRef idx="0">
+        <a:scrgbClr r="0" g="0" b="0"/>
+      </a:effectRef>
+      <a:fontRef idx="minor"/>
+    </dgm:style>
+  </dgm:styleLbl>
+  <dgm:styleLbl name="fgAcc4">
+    <dgm:scene3d>
+      <a:camera prst="orthographicFront"/>
+      <a:lightRig rig="threePt" dir="t"/>
+    </dgm:scene3d>
+    <dgm:sp3d/>
+    <dgm:txPr/>
+    <dgm:style>
+      <a:lnRef idx="1">
+        <a:scrgbClr r="0" g="0" b="0"/>
+      </a:lnRef>
+      <a:fillRef idx="1">
+        <a:scrgbClr r="0" g="0" b="0"/>
+      </a:fillRef>
+      <a:effectRef idx="0">
+        <a:scrgbClr r="0" g="0" b="0"/>
+      </a:effectRef>
+      <a:fontRef idx="minor"/>
+    </dgm:style>
+  </dgm:styleLbl>
+  <dgm:styleLbl name="bgShp">
+    <dgm:scene3d>
+      <a:camera prst="orthographicFront"/>
+      <a:lightRig rig="threePt" dir="t"/>
+    </dgm:scene3d>
+    <dgm:sp3d/>
+    <dgm:txPr/>
+    <dgm:style>
+      <a:lnRef idx="0">
+        <a:scrgbClr r="0" g="0" b="0"/>
+      </a:lnRef>
+      <a:fillRef idx="1">
+        <a:scrgbClr r="0" g="0" b="0"/>
+      </a:fillRef>
+      <a:effectRef idx="1">
+        <a:scrgbClr r="0" g="0" b="0"/>
+      </a:effectRef>
+      <a:fontRef idx="minor"/>
+    </dgm:style>
+  </dgm:styleLbl>
+  <dgm:styleLbl name="dkBgShp">
+    <dgm:scene3d>
+      <a:camera prst="orthographicFront"/>
+      <a:lightRig rig="threePt" dir="t"/>
+    </dgm:scene3d>
+    <dgm:sp3d/>
+    <dgm:txPr/>
+    <dgm:style>
+      <a:lnRef idx="0">
+        <a:scrgbClr r="0" g="0" b="0"/>
+      </a:lnRef>
+      <a:fillRef idx="1">
+        <a:scrgbClr r="0" g="0" b="0"/>
+      </a:fillRef>
+      <a:effectRef idx="1">
+        <a:scrgbClr r="0" g="0" b="0"/>
+      </a:effectRef>
+      <a:fontRef idx="minor"/>
+    </dgm:style>
+  </dgm:styleLbl>
+  <dgm:styleLbl name="trBgShp">
+    <dgm:scene3d>
+      <a:camera prst="orthographicFront"/>
+      <a:lightRig rig="threePt" dir="t"/>
+    </dgm:scene3d>
+    <dgm:sp3d/>
+    <dgm:txPr/>
+    <dgm:style>
+      <a:lnRef idx="0">
+        <a:scrgbClr r="0" g="0" b="0"/>
+      </a:lnRef>
+      <a:fillRef idx="1">
+        <a:scrgbClr r="0" g="0" b="0"/>
+      </a:fillRef>
+      <a:effectRef idx="0">
+        <a:scrgbClr r="0" g="0" b="0"/>
+      </a:effectRef>
+      <a:fontRef idx="minor"/>
+    </dgm:style>
+  </dgm:styleLbl>
+  <dgm:styleLbl name="fgShp">
+    <dgm:scene3d>
+      <a:camera prst="orthographicFront"/>
+      <a:lightRig rig="flat" dir="t"/>
+    </dgm:scene3d>
+    <dgm:sp3d prstMaterial="dkEdge">
+      <a:bevelT w="8200" h="38100"/>
+    </dgm:sp3d>
+    <dgm:txPr/>
+    <dgm:style>
+      <a:lnRef idx="1">
+        <a:scrgbClr r="0" g="0" b="0"/>
+      </a:lnRef>
+      <a:fillRef idx="2">
+        <a:scrgbClr r="0" g="0" b="0"/>
+      </a:fillRef>
+      <a:effectRef idx="1">
+        <a:scrgbClr r="0" g="0" b="0"/>
+      </a:effectRef>
+      <a:fontRef idx="minor"/>
+    </dgm:style>
+  </dgm:styleLbl>
+  <dgm:styleLbl name="revTx">
+    <dgm:scene3d>
+      <a:camera prst="orthographicFront"/>
+      <a:lightRig rig="threePt" dir="t"/>
+    </dgm:scene3d>
+    <dgm:sp3d/>
+    <dgm:txPr/>
+    <dgm:style>
+      <a:lnRef idx="0">
+        <a:scrgbClr r="0" g="0" b="0"/>
+      </a:lnRef>
+      <a:fillRef idx="0">
+        <a:scrgbClr r="0" g="0" b="0"/>
+      </a:fillRef>
+      <a:effectRef idx="0">
+        <a:scrgbClr r="0" g="0" b="0"/>
+      </a:effectRef>
+      <a:fontRef idx="minor"/>
+    </dgm:style>
+  </dgm:styleLbl>
+</dgm:styleDef>
+</file>
+
+<file path=ppt/notesMasters/notesMaster1.xml><?xml version="1.0" encoding="utf-8"?>
+<p:notesMaster xmlns:a="http://schemas.openxmlformats.org/drawingml/2006/main" xmlns:r="http://schemas.openxmlformats.org/officeDocument/2006/relationships" xmlns:p="http://schemas.openxmlformats.org/presentationml/2006/main">
+  <p:cSld>
+    <p:bg>
+      <p:bgRef idx="1001">
+        <a:schemeClr val="bg1"/>
+      </p:bgRef>
+    </p:bg>
+    <p:spTree>
+      <p:nvGrpSpPr>
+        <p:cNvPr id="1" name=""/>
+        <p:cNvGrpSpPr/>
+        <p:nvPr/>
+      </p:nvGrpSpPr>
+      <p:grpSpPr>
+        <a:xfrm>
+          <a:off x="0" y="0"/>
+          <a:ext cx="0" cy="0"/>
+          <a:chOff x="0" y="0"/>
+          <a:chExt cx="0" cy="0"/>
+        </a:xfrm>
+      </p:grpSpPr>
+      <p:sp>
+        <p:nvSpPr>
+          <p:cNvPr id="2" name="Header Placeholder 1"/>
+          <p:cNvSpPr>
+            <a:spLocks noGrp="1"/>
+          </p:cNvSpPr>
+          <p:nvPr>
+            <p:ph type="hdr" sz="quarter"/>
+          </p:nvPr>
+        </p:nvSpPr>
+        <p:spPr>
+          <a:xfrm>
+            <a:off x="0" y="0"/>
+            <a:ext cx="2971800" cy="458788"/>
+          </a:xfrm>
+          <a:prstGeom prst="rect">
+            <a:avLst/>
+          </a:prstGeom>
+        </p:spPr>
+        <p:txBody>
+          <a:bodyPr vert="horz" lIns="91440" tIns="45720" rIns="91440" bIns="45720" rtlCol="0"/>
+          <a:lstStyle>
+            <a:lvl1pPr algn="l">
+              <a:defRPr sz="1200"/>
+            </a:lvl1pPr>
+          </a:lstStyle>
+          <a:p>
+            <a:endParaRPr lang="en-US"/>
+          </a:p>
+        </p:txBody>
+      </p:sp>
+      <p:sp>
+        <p:nvSpPr>
+          <p:cNvPr id="3" name="Date Placeholder 2"/>
+          <p:cNvSpPr>
+            <a:spLocks noGrp="1"/>
+          </p:cNvSpPr>
+          <p:nvPr>
+            <p:ph type="dt" idx="1"/>
+          </p:nvPr>
+        </p:nvSpPr>
+        <p:spPr>
+          <a:xfrm>
+            <a:off x="3884613" y="0"/>
+            <a:ext cx="2971800" cy="458788"/>
+          </a:xfrm>
+          <a:prstGeom prst="rect">
+            <a:avLst/>
+          </a:prstGeom>
+        </p:spPr>
+        <p:txBody>
+          <a:bodyPr vert="horz" lIns="91440" tIns="45720" rIns="91440" bIns="45720" rtlCol="0"/>
+          <a:lstStyle>
+            <a:lvl1pPr algn="r">
+              <a:defRPr sz="1200"/>
+            </a:lvl1pPr>
+          </a:lstStyle>
+          <a:p>
+            <a:fld id="{78E267B2-D7C0-4F13-9700-DA0DFE5D8BEF}" type="datetimeFigureOut">
+              <a:rPr lang="en-US" smtClean="0"/>
+              <a:t>10/9/2019</a:t>
+            </a:fld>
+            <a:endParaRPr lang="en-US"/>
+          </a:p>
+        </p:txBody>
+      </p:sp>
+      <p:sp>
+        <p:nvSpPr>
+          <p:cNvPr id="4" name="Slide Image Placeholder 3"/>
+          <p:cNvSpPr>
+            <a:spLocks noGrp="1" noRot="1" noChangeAspect="1"/>
+          </p:cNvSpPr>
+          <p:nvPr>
+            <p:ph type="sldImg" idx="2"/>
+          </p:nvPr>
+        </p:nvSpPr>
+        <p:spPr>
+          <a:xfrm>
+            <a:off x="685800" y="1143000"/>
+            <a:ext cx="5486400" cy="3086100"/>
+          </a:xfrm>
+          <a:prstGeom prst="rect">
+            <a:avLst/>
+          </a:prstGeom>
+          <a:noFill/>
+          <a:ln w="12700">
+            <a:solidFill>
+              <a:prstClr val="black"/>
+            </a:solidFill>
+          </a:ln>
+        </p:spPr>
+        <p:txBody>
+          <a:bodyPr vert="horz" lIns="91440" tIns="45720" rIns="91440" bIns="45720" rtlCol="0" anchor="ctr"/>
+          <a:lstStyle/>
+          <a:p>
+            <a:endParaRPr lang="en-US"/>
+          </a:p>
+        </p:txBody>
+      </p:sp>
+      <p:sp>
+        <p:nvSpPr>
+          <p:cNvPr id="5" name="Notes Placeholder 4"/>
+          <p:cNvSpPr>
+            <a:spLocks noGrp="1"/>
+          </p:cNvSpPr>
+          <p:nvPr>
+            <p:ph type="body" sz="quarter" idx="3"/>
+          </p:nvPr>
+        </p:nvSpPr>
+        <p:spPr>
+          <a:xfrm>
+            <a:off x="685800" y="4400550"/>
+            <a:ext cx="5486400" cy="3600450"/>
+          </a:xfrm>
+          <a:prstGeom prst="rect">
+            <a:avLst/>
+          </a:prstGeom>
+        </p:spPr>
+        <p:txBody>
+          <a:bodyPr vert="horz" lIns="91440" tIns="45720" rIns="91440" bIns="45720" rtlCol="0"/>
+          <a:lstStyle/>
+          <a:p>
+            <a:pPr lvl="0"/>
+            <a:r>
+              <a:rPr lang="en-US"/>
+              <a:t>Click to edit Master text styles</a:t>
+            </a:r>
+          </a:p>
+          <a:p>
+            <a:pPr lvl="1"/>
+            <a:r>
+              <a:rPr lang="en-US"/>
+              <a:t>Second level</a:t>
+            </a:r>
+          </a:p>
+          <a:p>
+            <a:pPr lvl="2"/>
+            <a:r>
+              <a:rPr lang="en-US"/>
+              <a:t>Third level</a:t>
+            </a:r>
+          </a:p>
+          <a:p>
+            <a:pPr lvl="3"/>
+            <a:r>
+              <a:rPr lang="en-US"/>
+              <a:t>Fourth level</a:t>
+            </a:r>
+          </a:p>
+          <a:p>
+            <a:pPr lvl="4"/>
+            <a:r>
+              <a:rPr lang="en-US"/>
+              <a:t>Fifth level</a:t>
+            </a:r>
+          </a:p>
+        </p:txBody>
+      </p:sp>
+      <p:sp>
+        <p:nvSpPr>
+          <p:cNvPr id="6" name="Footer Placeholder 5"/>
+          <p:cNvSpPr>
+            <a:spLocks noGrp="1"/>
+          </p:cNvSpPr>
+          <p:nvPr>
+            <p:ph type="ftr" sz="quarter" idx="4"/>
+          </p:nvPr>
+        </p:nvSpPr>
+        <p:spPr>
+          <a:xfrm>
+            <a:off x="0" y="8685213"/>
+            <a:ext cx="2971800" cy="458787"/>
+          </a:xfrm>
+          <a:prstGeom prst="rect">
+            <a:avLst/>
+          </a:prstGeom>
+        </p:spPr>
+        <p:txBody>
+          <a:bodyPr vert="horz" lIns="91440" tIns="45720" rIns="91440" bIns="45720" rtlCol="0" anchor="b"/>
+          <a:lstStyle>
+            <a:lvl1pPr algn="l">
+              <a:defRPr sz="1200"/>
+            </a:lvl1pPr>
+          </a:lstStyle>
+          <a:p>
+            <a:endParaRPr lang="en-US"/>
+          </a:p>
+        </p:txBody>
+      </p:sp>
+      <p:sp>
+        <p:nvSpPr>
+          <p:cNvPr id="7" name="Slide Number Placeholder 6"/>
+          <p:cNvSpPr>
+            <a:spLocks noGrp="1"/>
+          </p:cNvSpPr>
+          <p:nvPr>
+            <p:ph type="sldNum" sz="quarter" idx="5"/>
+          </p:nvPr>
+        </p:nvSpPr>
+        <p:spPr>
+          <a:xfrm>
+            <a:off x="3884613" y="8685213"/>
+            <a:ext cx="2971800" cy="458787"/>
+          </a:xfrm>
+          <a:prstGeom prst="rect">
+            <a:avLst/>
+          </a:prstGeom>
+        </p:spPr>
+        <p:txBody>
+          <a:bodyPr vert="horz" lIns="91440" tIns="45720" rIns="91440" bIns="45720" rtlCol="0" anchor="b"/>
+          <a:lstStyle>
+            <a:lvl1pPr algn="r">
+              <a:defRPr sz="1200"/>
+            </a:lvl1pPr>
+          </a:lstStyle>
+          <a:p>
+            <a:fld id="{7D16E168-0216-44BC-9E32-22F7340DBE9A}" type="slidenum">
+              <a:rPr lang="en-US" smtClean="0"/>
+              <a:t>‹#›</a:t>
+            </a:fld>
+            <a:endParaRPr lang="en-US"/>
+          </a:p>
+        </p:txBody>
+      </p:sp>
+    </p:spTree>
+    <p:extLst>
+      <p:ext uri="{BB962C8B-B14F-4D97-AF65-F5344CB8AC3E}">
+        <p14:creationId xmlns:p14="http://schemas.microsoft.com/office/powerpoint/2010/main" val="1538119870"/>
+      </p:ext>
+    </p:extLst>
+  </p:cSld>
+  <p:clrMap bg1="lt1" tx1="dk1" bg2="lt2" tx2="dk2" accent1="accent1" accent2="accent2" accent3="accent3" accent4="accent4" accent5="accent5" accent6="accent6" hlink="hlink" folHlink="folHlink"/>
+  <p:notesStyle>
+    <a:lvl1pPr marL="0" algn="l" defTabSz="914400" rtl="0" eaLnBrk="1" latinLnBrk="0" hangingPunct="1">
+      <a:defRPr sz="1200" kern="1200">
+        <a:solidFill>
+          <a:schemeClr val="tx1"/>
+        </a:solidFill>
+        <a:latin typeface="+mn-lt"/>
+        <a:ea typeface="+mn-ea"/>
+        <a:cs typeface="+mn-cs"/>
+      </a:defRPr>
+    </a:lvl1pPr>
+    <a:lvl2pPr marL="457200" algn="l" defTabSz="914400" rtl="0" eaLnBrk="1" latinLnBrk="0" hangingPunct="1">
+      <a:defRPr sz="1200" kern="1200">
+        <a:solidFill>
+          <a:schemeClr val="tx1"/>
+        </a:solidFill>
+        <a:latin typeface="+mn-lt"/>
+        <a:ea typeface="+mn-ea"/>
+        <a:cs typeface="+mn-cs"/>
+      </a:defRPr>
+    </a:lvl2pPr>
+    <a:lvl3pPr marL="914400" algn="l" defTabSz="914400" rtl="0" eaLnBrk="1" latinLnBrk="0" hangingPunct="1">
+      <a:defRPr sz="1200" kern="1200">
+        <a:solidFill>
+          <a:schemeClr val="tx1"/>
+        </a:solidFill>
+        <a:latin typeface="+mn-lt"/>
+        <a:ea typeface="+mn-ea"/>
+        <a:cs typeface="+mn-cs"/>
+      </a:defRPr>
+    </a:lvl3pPr>
+    <a:lvl4pPr marL="1371600" algn="l" defTabSz="914400" rtl="0" eaLnBrk="1" latinLnBrk="0" hangingPunct="1">
+      <a:defRPr sz="1200" kern="1200">
+        <a:solidFill>
+          <a:schemeClr val="tx1"/>
+        </a:solidFill>
+        <a:latin typeface="+mn-lt"/>
+        <a:ea typeface="+mn-ea"/>
+        <a:cs typeface="+mn-cs"/>
+      </a:defRPr>
+    </a:lvl4pPr>
+    <a:lvl5pPr marL="1828800" algn="l" defTabSz="914400" rtl="0" eaLnBrk="1" latinLnBrk="0" hangingPunct="1">
+      <a:defRPr sz="1200" kern="1200">
+        <a:solidFill>
+          <a:schemeClr val="tx1"/>
+        </a:solidFill>
+        <a:latin typeface="+mn-lt"/>
+        <a:ea typeface="+mn-ea"/>
+        <a:cs typeface="+mn-cs"/>
+      </a:defRPr>
+    </a:lvl5pPr>
+    <a:lvl6pPr marL="2286000" algn="l" defTabSz="914400" rtl="0" eaLnBrk="1" latinLnBrk="0" hangingPunct="1">
+      <a:defRPr sz="1200" kern="1200">
+        <a:solidFill>
+          <a:schemeClr val="tx1"/>
+        </a:solidFill>
+        <a:latin typeface="+mn-lt"/>
+        <a:ea typeface="+mn-ea"/>
+        <a:cs typeface="+mn-cs"/>
+      </a:defRPr>
+    </a:lvl6pPr>
+    <a:lvl7pPr marL="2743200" algn="l" defTabSz="914400" rtl="0" eaLnBrk="1" latinLnBrk="0" hangingPunct="1">
+      <a:defRPr sz="1200" kern="1200">
+        <a:solidFill>
+          <a:schemeClr val="tx1"/>
+        </a:solidFill>
+        <a:latin typeface="+mn-lt"/>
+        <a:ea typeface="+mn-ea"/>
+        <a:cs typeface="+mn-cs"/>
+      </a:defRPr>
+    </a:lvl7pPr>
+    <a:lvl8pPr marL="3200400" algn="l" defTabSz="914400" rtl="0" eaLnBrk="1" latinLnBrk="0" hangingPunct="1">
+      <a:defRPr sz="1200" kern="1200">
+        <a:solidFill>
+          <a:schemeClr val="tx1"/>
+        </a:solidFill>
+        <a:latin typeface="+mn-lt"/>
+        <a:ea typeface="+mn-ea"/>
+        <a:cs typeface="+mn-cs"/>
+      </a:defRPr>
+    </a:lvl8pPr>
+    <a:lvl9pPr marL="3657600" algn="l" defTabSz="914400" rtl="0" eaLnBrk="1" latinLnBrk="0" hangingPunct="1">
+      <a:defRPr sz="1200" kern="1200">
+        <a:solidFill>
+          <a:schemeClr val="tx1"/>
+        </a:solidFill>
+        <a:latin typeface="+mn-lt"/>
+        <a:ea typeface="+mn-ea"/>
+        <a:cs typeface="+mn-cs"/>
+      </a:defRPr>
+    </a:lvl9pPr>
+  </p:notesStyle>
+</p:notesMaster>
 </file>
 
 <file path=ppt/slideLayouts/slideLayout1.xml><?xml version="1.0" encoding="utf-8"?>
@@ -271,7 +2923,7 @@
           <a:p>
             <a:fld id="{16359517-56A1-4CAF-BF01-997A9DD231B8}" type="datetimeFigureOut">
               <a:rPr lang="en-US" smtClean="0"/>
-              <a:t>10/7/2019</a:t>
+              <a:t>10/9/2019</a:t>
             </a:fld>
             <a:endParaRPr lang="en-US" dirty="0"/>
           </a:p>
@@ -469,7 +3121,7 @@
           <a:p>
             <a:fld id="{16359517-56A1-4CAF-BF01-997A9DD231B8}" type="datetimeFigureOut">
               <a:rPr lang="en-US" smtClean="0"/>
-              <a:t>10/7/2019</a:t>
+              <a:t>10/9/2019</a:t>
             </a:fld>
             <a:endParaRPr lang="en-US" dirty="0"/>
           </a:p>
@@ -677,7 +3329,7 @@
           <a:p>
             <a:fld id="{16359517-56A1-4CAF-BF01-997A9DD231B8}" type="datetimeFigureOut">
               <a:rPr lang="en-US" smtClean="0"/>
-              <a:t>10/7/2019</a:t>
+              <a:t>10/9/2019</a:t>
             </a:fld>
             <a:endParaRPr lang="en-US" dirty="0"/>
           </a:p>
@@ -875,7 +3527,7 @@
           <a:p>
             <a:fld id="{16359517-56A1-4CAF-BF01-997A9DD231B8}" type="datetimeFigureOut">
               <a:rPr lang="en-US" smtClean="0"/>
-              <a:t>10/7/2019</a:t>
+              <a:t>10/9/2019</a:t>
             </a:fld>
             <a:endParaRPr lang="en-US" dirty="0"/>
           </a:p>
@@ -1150,7 +3802,7 @@
           <a:p>
             <a:fld id="{16359517-56A1-4CAF-BF01-997A9DD231B8}" type="datetimeFigureOut">
               <a:rPr lang="en-US" smtClean="0"/>
-              <a:t>10/7/2019</a:t>
+              <a:t>10/9/2019</a:t>
             </a:fld>
             <a:endParaRPr lang="en-US" dirty="0"/>
           </a:p>
@@ -1415,7 +4067,7 @@
           <a:p>
             <a:fld id="{16359517-56A1-4CAF-BF01-997A9DD231B8}" type="datetimeFigureOut">
               <a:rPr lang="en-US" smtClean="0"/>
-              <a:t>10/7/2019</a:t>
+              <a:t>10/9/2019</a:t>
             </a:fld>
             <a:endParaRPr lang="en-US" dirty="0"/>
           </a:p>
@@ -1827,7 +4479,7 @@
           <a:p>
             <a:fld id="{16359517-56A1-4CAF-BF01-997A9DD231B8}" type="datetimeFigureOut">
               <a:rPr lang="en-US" smtClean="0"/>
-              <a:t>10/7/2019</a:t>
+              <a:t>10/9/2019</a:t>
             </a:fld>
             <a:endParaRPr lang="en-US" dirty="0"/>
           </a:p>
@@ -1968,7 +4620,7 @@
           <a:p>
             <a:fld id="{16359517-56A1-4CAF-BF01-997A9DD231B8}" type="datetimeFigureOut">
               <a:rPr lang="en-US" smtClean="0"/>
-              <a:t>10/7/2019</a:t>
+              <a:t>10/9/2019</a:t>
             </a:fld>
             <a:endParaRPr lang="en-US" dirty="0"/>
           </a:p>
@@ -2081,7 +4733,7 @@
           <a:p>
             <a:fld id="{16359517-56A1-4CAF-BF01-997A9DD231B8}" type="datetimeFigureOut">
               <a:rPr lang="en-US" smtClean="0"/>
-              <a:t>10/7/2019</a:t>
+              <a:t>10/9/2019</a:t>
             </a:fld>
             <a:endParaRPr lang="en-US" dirty="0"/>
           </a:p>
@@ -2392,7 +5044,7 @@
           <a:p>
             <a:fld id="{16359517-56A1-4CAF-BF01-997A9DD231B8}" type="datetimeFigureOut">
               <a:rPr lang="en-US" smtClean="0"/>
-              <a:t>10/7/2019</a:t>
+              <a:t>10/9/2019</a:t>
             </a:fld>
             <a:endParaRPr lang="en-US" dirty="0"/>
           </a:p>
@@ -2680,7 +5332,7 @@
           <a:p>
             <a:fld id="{16359517-56A1-4CAF-BF01-997A9DD231B8}" type="datetimeFigureOut">
               <a:rPr lang="en-US" smtClean="0"/>
-              <a:t>10/7/2019</a:t>
+              <a:t>10/9/2019</a:t>
             </a:fld>
             <a:endParaRPr lang="en-US" dirty="0"/>
           </a:p>
@@ -2921,7 +5573,7 @@
           <a:p>
             <a:fld id="{16359517-56A1-4CAF-BF01-997A9DD231B8}" type="datetimeFigureOut">
               <a:rPr lang="en-US" smtClean="0"/>
-              <a:t>10/7/2019</a:t>
+              <a:t>10/9/2019</a:t>
             </a:fld>
             <a:endParaRPr lang="en-US" dirty="0"/>
           </a:p>
@@ -3367,7 +6019,11 @@
           <a:lstStyle/>
           <a:p>
             <a:r>
-              <a:rPr lang="en-US" u="sng" dirty="0"/>
+              <a:rPr lang="en-US" u="sng" dirty="0">
+                <a:solidFill>
+                  <a:srgbClr val="0070C0"/>
+                </a:solidFill>
+              </a:rPr>
               <a:t>Group 5 Project 1</a:t>
             </a:r>
             <a:br>
@@ -3377,7 +6033,11 @@
               <a:rPr lang="en-US" dirty="0"/>
             </a:br>
             <a:r>
-              <a:rPr lang="en-US" i="1" dirty="0"/>
+              <a:rPr lang="en-US" b="1" i="1" dirty="0">
+                <a:solidFill>
+                  <a:srgbClr val="0070C0"/>
+                </a:solidFill>
+              </a:rPr>
               <a:t>We believe United States articles will be the most popular with the New York Times.</a:t>
             </a:r>
           </a:p>
@@ -3401,7 +6061,7 @@
         </p:nvSpPr>
         <p:spPr>
           <a:xfrm>
-            <a:off x="1524000" y="4267200"/>
+            <a:off x="1524000" y="4347411"/>
             <a:ext cx="9144000" cy="2022764"/>
           </a:xfrm>
         </p:spPr>
@@ -3412,13 +6072,21 @@
           <a:lstStyle/>
           <a:p>
             <a:r>
-              <a:rPr lang="en-US" sz="4000" dirty="0"/>
+              <a:rPr lang="en-US" sz="4000" b="1" dirty="0">
+                <a:solidFill>
+                  <a:srgbClr val="FF0000"/>
+                </a:solidFill>
+              </a:rPr>
               <a:t>By: Jacob, George, David, Matt, Kenneth</a:t>
             </a:r>
           </a:p>
           <a:p>
             <a:r>
-              <a:rPr lang="en-US" sz="4000" u="sng" dirty="0"/>
+              <a:rPr lang="en-US" sz="4000" b="1" u="sng" dirty="0">
+                <a:solidFill>
+                  <a:srgbClr val="FF0000"/>
+                </a:solidFill>
+              </a:rPr>
               <a:t>Found data: NYT API</a:t>
             </a:r>
           </a:p>
@@ -3776,36 +6444,6 @@
           <a:chExt cx="0" cy="0"/>
         </a:xfrm>
       </p:grpSpPr>
-    </p:spTree>
-    <p:extLst>
-      <p:ext uri="{BB962C8B-B14F-4D97-AF65-F5344CB8AC3E}">
-        <p14:creationId xmlns:p14="http://schemas.microsoft.com/office/powerpoint/2010/main" val="3986003696"/>
-      </p:ext>
-    </p:extLst>
-  </p:cSld>
-  <p:clrMapOvr>
-    <a:masterClrMapping/>
-  </p:clrMapOvr>
-</p:sld>
-</file>
-
-<file path=ppt/slides/slide13.xml><?xml version="1.0" encoding="utf-8"?>
-<p:sld xmlns:a="http://schemas.openxmlformats.org/drawingml/2006/main" xmlns:r="http://schemas.openxmlformats.org/officeDocument/2006/relationships" xmlns:p="http://schemas.openxmlformats.org/presentationml/2006/main">
-  <p:cSld>
-    <p:spTree>
-      <p:nvGrpSpPr>
-        <p:cNvPr id="1" name=""/>
-        <p:cNvGrpSpPr/>
-        <p:nvPr/>
-      </p:nvGrpSpPr>
-      <p:grpSpPr>
-        <a:xfrm>
-          <a:off x="0" y="0"/>
-          <a:ext cx="0" cy="0"/>
-          <a:chOff x="0" y="0"/>
-          <a:chExt cx="0" cy="0"/>
-        </a:xfrm>
-      </p:grpSpPr>
       <p:sp>
         <p:nvSpPr>
           <p:cNvPr id="2" name="Title 1">
@@ -3941,7 +6579,7 @@
 </p:sld>
 </file>
 
-<file path=ppt/slides/slide14.xml><?xml version="1.0" encoding="utf-8"?>
+<file path=ppt/slides/slide13.xml><?xml version="1.0" encoding="utf-8"?>
 <p:sld xmlns:a="http://schemas.openxmlformats.org/drawingml/2006/main" xmlns:r="http://schemas.openxmlformats.org/officeDocument/2006/relationships" xmlns:p="http://schemas.openxmlformats.org/presentationml/2006/main">
   <p:cSld>
     <p:spTree>
@@ -4093,7 +6731,7 @@
 </p:sld>
 </file>
 
-<file path=ppt/slides/slide15.xml><?xml version="1.0" encoding="utf-8"?>
+<file path=ppt/slides/slide14.xml><?xml version="1.0" encoding="utf-8"?>
 <p:sld xmlns:a="http://schemas.openxmlformats.org/drawingml/2006/main" xmlns:r="http://schemas.openxmlformats.org/officeDocument/2006/relationships" xmlns:p="http://schemas.openxmlformats.org/presentationml/2006/main">
   <p:cSld>
     <p:spTree>
@@ -4245,7 +6883,7 @@
 </p:sld>
 </file>
 
-<file path=ppt/slides/slide16.xml><?xml version="1.0" encoding="utf-8"?>
+<file path=ppt/slides/slide15.xml><?xml version="1.0" encoding="utf-8"?>
 <p:sld xmlns:a="http://schemas.openxmlformats.org/drawingml/2006/main" xmlns:r="http://schemas.openxmlformats.org/officeDocument/2006/relationships" xmlns:p="http://schemas.openxmlformats.org/presentationml/2006/main">
   <p:cSld>
     <p:spTree>
@@ -4397,7 +7035,7 @@
 </p:sld>
 </file>
 
-<file path=ppt/slides/slide17.xml><?xml version="1.0" encoding="utf-8"?>
+<file path=ppt/slides/slide16.xml><?xml version="1.0" encoding="utf-8"?>
 <p:sld xmlns:a="http://schemas.openxmlformats.org/drawingml/2006/main" xmlns:r="http://schemas.openxmlformats.org/officeDocument/2006/relationships" xmlns:p="http://schemas.openxmlformats.org/presentationml/2006/main">
   <p:cSld>
     <p:spTree>
@@ -4555,6 +7193,123 @@
 </p:sld>
 </file>
 
+<file path=ppt/slides/slide17.xml><?xml version="1.0" encoding="utf-8"?>
+<p:sld xmlns:a="http://schemas.openxmlformats.org/drawingml/2006/main" xmlns:r="http://schemas.openxmlformats.org/officeDocument/2006/relationships" xmlns:p="http://schemas.openxmlformats.org/presentationml/2006/main">
+  <p:cSld>
+    <p:spTree>
+      <p:nvGrpSpPr>
+        <p:cNvPr id="1" name=""/>
+        <p:cNvGrpSpPr/>
+        <p:nvPr/>
+      </p:nvGrpSpPr>
+      <p:grpSpPr>
+        <a:xfrm>
+          <a:off x="0" y="0"/>
+          <a:ext cx="0" cy="0"/>
+          <a:chOff x="0" y="0"/>
+          <a:chExt cx="0" cy="0"/>
+        </a:xfrm>
+      </p:grpSpPr>
+      <p:pic>
+        <p:nvPicPr>
+          <p:cNvPr id="7" name="Picture 6">
+            <a:extLst>
+              <a:ext uri="{FF2B5EF4-FFF2-40B4-BE49-F238E27FC236}">
+                <a16:creationId xmlns:a16="http://schemas.microsoft.com/office/drawing/2014/main" id="{AB437E50-804A-4BF8-BA90-4A5C3DE778B2}"/>
+              </a:ext>
+            </a:extLst>
+          </p:cNvPr>
+          <p:cNvPicPr>
+            <a:picLocks noChangeAspect="1"/>
+          </p:cNvPicPr>
+          <p:nvPr/>
+        </p:nvPicPr>
+        <p:blipFill>
+          <a:blip r:embed="rId2"/>
+          <a:stretch>
+            <a:fillRect/>
+          </a:stretch>
+        </p:blipFill>
+        <p:spPr>
+          <a:xfrm>
+            <a:off x="2409760" y="755009"/>
+            <a:ext cx="9782240" cy="6019101"/>
+          </a:xfrm>
+          <a:prstGeom prst="rect">
+            <a:avLst/>
+          </a:prstGeom>
+        </p:spPr>
+      </p:pic>
+      <p:graphicFrame>
+        <p:nvGraphicFramePr>
+          <p:cNvPr id="9" name="Diagram 8">
+            <a:extLst>
+              <a:ext uri="{FF2B5EF4-FFF2-40B4-BE49-F238E27FC236}">
+                <a16:creationId xmlns:a16="http://schemas.microsoft.com/office/drawing/2014/main" id="{4D8A82A5-E4A0-410D-A014-6285248B1343}"/>
+              </a:ext>
+            </a:extLst>
+          </p:cNvPr>
+          <p:cNvGraphicFramePr/>
+          <p:nvPr/>
+        </p:nvGraphicFramePr>
+        <p:xfrm>
+          <a:off x="73424" y="83890"/>
+          <a:ext cx="3416395" cy="1954635"/>
+        </p:xfrm>
+        <a:graphic>
+          <a:graphicData uri="http://schemas.openxmlformats.org/drawingml/2006/diagram">
+            <dgm:relIds xmlns:dgm="http://schemas.openxmlformats.org/drawingml/2006/diagram" xmlns:r="http://schemas.openxmlformats.org/officeDocument/2006/relationships" r:dm="rId3" r:lo="rId4" r:qs="rId5" r:cs="rId6"/>
+          </a:graphicData>
+        </a:graphic>
+      </p:graphicFrame>
+      <p:sp>
+        <p:nvSpPr>
+          <p:cNvPr id="10" name="TextBox 9">
+            <a:extLst>
+              <a:ext uri="{FF2B5EF4-FFF2-40B4-BE49-F238E27FC236}">
+                <a16:creationId xmlns:a16="http://schemas.microsoft.com/office/drawing/2014/main" id="{1C042D1D-80FC-4265-8109-C4406669DC4A}"/>
+              </a:ext>
+            </a:extLst>
+          </p:cNvPr>
+          <p:cNvSpPr txBox="1"/>
+          <p:nvPr/>
+        </p:nvSpPr>
+        <p:spPr>
+          <a:xfrm>
+            <a:off x="4404221" y="219395"/>
+            <a:ext cx="5570289" cy="400110"/>
+          </a:xfrm>
+          <a:prstGeom prst="rect">
+            <a:avLst/>
+          </a:prstGeom>
+          <a:noFill/>
+        </p:spPr>
+        <p:txBody>
+          <a:bodyPr wrap="square" rtlCol="0">
+            <a:spAutoFit/>
+          </a:bodyPr>
+          <a:lstStyle/>
+          <a:p>
+            <a:r>
+              <a:rPr lang="en-US" sz="2000" b="1" dirty="0"/>
+              <a:t>Top Keyword Usage by New York Times Authors</a:t>
+            </a:r>
+          </a:p>
+        </p:txBody>
+      </p:sp>
+    </p:spTree>
+    <p:extLst>
+      <p:ext uri="{BB962C8B-B14F-4D97-AF65-F5344CB8AC3E}">
+        <p14:creationId xmlns:p14="http://schemas.microsoft.com/office/powerpoint/2010/main" val="326588872"/>
+      </p:ext>
+    </p:extLst>
+  </p:cSld>
+  <p:clrMapOvr>
+    <a:masterClrMapping/>
+  </p:clrMapOvr>
+</p:sld>
+</file>
+
 <file path=ppt/slides/slide18.xml><?xml version="1.0" encoding="utf-8"?>
 <p:sld xmlns:a="http://schemas.openxmlformats.org/drawingml/2006/main" xmlns:r="http://schemas.openxmlformats.org/officeDocument/2006/relationships" xmlns:p="http://schemas.openxmlformats.org/presentationml/2006/main">
   <p:cSld>
@@ -4577,6 +7332,103 @@
           <p:cNvPr id="2" name="Title 1">
             <a:extLst>
               <a:ext uri="{FF2B5EF4-FFF2-40B4-BE49-F238E27FC236}">
+                <a16:creationId xmlns:a16="http://schemas.microsoft.com/office/drawing/2014/main" id="{69A5029D-E92F-4626-AEF5-46CA04560CB2}"/>
+              </a:ext>
+            </a:extLst>
+          </p:cNvPr>
+          <p:cNvSpPr>
+            <a:spLocks noGrp="1"/>
+          </p:cNvSpPr>
+          <p:nvPr>
+            <p:ph type="title"/>
+          </p:nvPr>
+        </p:nvSpPr>
+        <p:spPr>
+          <a:xfrm>
+            <a:off x="838200" y="365125"/>
+            <a:ext cx="10515600" cy="6080499"/>
+          </a:xfrm>
+        </p:spPr>
+        <p:txBody>
+          <a:bodyPr/>
+          <a:lstStyle/>
+          <a:p>
+            <a:r>
+              <a:rPr lang="en-US" dirty="0"/>
+              <a:t>Conclusions:</a:t>
+            </a:r>
+            <a:br>
+              <a:rPr lang="en-US" dirty="0"/>
+            </a:br>
+            <a:br>
+              <a:rPr lang="en-US" dirty="0"/>
+            </a:br>
+            <a:r>
+              <a:rPr lang="en-US" dirty="0"/>
+              <a:t>1) The Data</a:t>
+            </a:r>
+            <a:br>
+              <a:rPr lang="en-US" dirty="0"/>
+            </a:br>
+            <a:br>
+              <a:rPr lang="en-US" dirty="0"/>
+            </a:br>
+            <a:r>
+              <a:rPr lang="en-US" dirty="0"/>
+              <a:t>2) The Data</a:t>
+            </a:r>
+            <a:br>
+              <a:rPr lang="en-US" dirty="0"/>
+            </a:br>
+            <a:br>
+              <a:rPr lang="en-US" dirty="0"/>
+            </a:br>
+            <a:r>
+              <a:rPr lang="en-US" dirty="0"/>
+              <a:t>3) The Data</a:t>
+            </a:r>
+            <a:br>
+              <a:rPr lang="en-US" dirty="0"/>
+            </a:br>
+            <a:endParaRPr lang="en-US" dirty="0"/>
+          </a:p>
+        </p:txBody>
+      </p:sp>
+    </p:spTree>
+    <p:extLst>
+      <p:ext uri="{BB962C8B-B14F-4D97-AF65-F5344CB8AC3E}">
+        <p14:creationId xmlns:p14="http://schemas.microsoft.com/office/powerpoint/2010/main" val="4236557223"/>
+      </p:ext>
+    </p:extLst>
+  </p:cSld>
+  <p:clrMapOvr>
+    <a:masterClrMapping/>
+  </p:clrMapOvr>
+</p:sld>
+</file>
+
+<file path=ppt/slides/slide19.xml><?xml version="1.0" encoding="utf-8"?>
+<p:sld xmlns:a="http://schemas.openxmlformats.org/drawingml/2006/main" xmlns:r="http://schemas.openxmlformats.org/officeDocument/2006/relationships" xmlns:p="http://schemas.openxmlformats.org/presentationml/2006/main">
+  <p:cSld>
+    <p:spTree>
+      <p:nvGrpSpPr>
+        <p:cNvPr id="1" name=""/>
+        <p:cNvGrpSpPr/>
+        <p:nvPr/>
+      </p:nvGrpSpPr>
+      <p:grpSpPr>
+        <a:xfrm>
+          <a:off x="0" y="0"/>
+          <a:ext cx="0" cy="0"/>
+          <a:chOff x="0" y="0"/>
+          <a:chExt cx="0" cy="0"/>
+        </a:xfrm>
+      </p:grpSpPr>
+      <p:sp>
+        <p:nvSpPr>
+          <p:cNvPr id="2" name="Title 1">
+            <a:extLst>
+              <a:ext uri="{FF2B5EF4-FFF2-40B4-BE49-F238E27FC236}">
                 <a16:creationId xmlns:a16="http://schemas.microsoft.com/office/drawing/2014/main" id="{63D87AE4-8F62-41B3-99E4-724A1523D72B}"/>
               </a:ext>
             </a:extLst>
@@ -4591,18 +7443,51 @@
         <p:spPr>
           <a:xfrm>
             <a:off x="598503" y="443882"/>
-            <a:ext cx="10515600" cy="3657601"/>
+            <a:ext cx="10515600" cy="6414118"/>
           </a:xfrm>
         </p:spPr>
         <p:txBody>
-          <a:bodyPr/>
+          <a:bodyPr>
+            <a:normAutofit/>
+          </a:bodyPr>
           <a:lstStyle/>
           <a:p>
             <a:pPr algn="ctr"/>
             <a:r>
+              <a:rPr lang="en-US" sz="5300" b="1" dirty="0"/>
+              <a:t>Thank you!</a:t>
+            </a:r>
+            <a:br>
+              <a:rPr lang="en-US" sz="5300" b="1" dirty="0"/>
+            </a:br>
+            <a:r>
+              <a:rPr lang="en-US" sz="5300" b="1" dirty="0"/>
+              <a:t>Group 5</a:t>
+            </a:r>
+            <a:br>
+              <a:rPr lang="en-US" sz="5300" b="1" dirty="0"/>
+            </a:br>
+            <a:r>
+              <a:rPr lang="en-US" sz="4800" b="1" dirty="0"/>
+              <a:t>By: Jacob, George, David, Matt, Kenneth</a:t>
+            </a:r>
+            <a:br>
+              <a:rPr lang="en-US" sz="4800" b="1" dirty="0"/>
+            </a:br>
+            <a:br>
+              <a:rPr lang="en-US" sz="5300" b="1" dirty="0"/>
+            </a:br>
+            <a:r>
+              <a:rPr lang="en-US" sz="5300" b="1" u="sng" dirty="0"/>
+              <a:t>All Data was derived from: NYT API</a:t>
+            </a:r>
+            <a:br>
+              <a:rPr lang="en-US" u="sng" dirty="0"/>
+            </a:br>
+            <a:br>
               <a:rPr lang="en-US" dirty="0"/>
-              <a:t>Summary:</a:t>
-            </a:r>
+            </a:br>
+            <a:endParaRPr lang="en-US" dirty="0"/>
           </a:p>
         </p:txBody>
       </p:sp>
@@ -4650,7 +7535,7 @@
         </p:nvSpPr>
         <p:spPr>
           <a:xfrm>
-            <a:off x="900545" y="720436"/>
+            <a:off x="1028882" y="1028343"/>
             <a:ext cx="9761537" cy="4801314"/>
           </a:xfrm>
           <a:prstGeom prst="rect">
@@ -4676,7 +7561,7 @@
             <a:br>
               <a:rPr lang="en-US" b="1" i="0" dirty="0">
                 <a:solidFill>
-                  <a:srgbClr val="000000"/>
+                  <a:schemeClr val="accent1"/>
                 </a:solidFill>
                 <a:effectLst/>
                 <a:latin typeface="Times New Roman" panose="02020603050405020304" pitchFamily="18" charset="0"/>
@@ -4685,7 +7570,7 @@
             <a:r>
               <a:rPr lang="en-US" b="1" i="0" dirty="0">
                 <a:solidFill>
-                  <a:srgbClr val="000000"/>
+                  <a:schemeClr val="accent1"/>
                 </a:solidFill>
                 <a:effectLst/>
                 <a:latin typeface="Times New Roman" panose="02020603050405020304" pitchFamily="18" charset="0"/>
@@ -4693,7 +7578,11 @@
               <a:t>1) </a:t>
             </a:r>
             <a:r>
-              <a:rPr lang="en-US" b="1" dirty="0"/>
+              <a:rPr lang="en-US" b="1" dirty="0">
+                <a:solidFill>
+                  <a:schemeClr val="accent1"/>
+                </a:solidFill>
+              </a:rPr>
               <a:t>Define the core message or hypothesis of your project.</a:t>
             </a:r>
           </a:p>
@@ -4708,10 +7597,18 @@
           </a:p>
           <a:p>
             <a:br>
-              <a:rPr lang="en-US" b="1" dirty="0"/>
+              <a:rPr lang="en-US" b="1" dirty="0">
+                <a:solidFill>
+                  <a:schemeClr val="accent1"/>
+                </a:solidFill>
+              </a:rPr>
             </a:br>
             <a:r>
-              <a:rPr lang="en-US" b="1" dirty="0"/>
+              <a:rPr lang="en-US" b="1" dirty="0">
+                <a:solidFill>
+                  <a:schemeClr val="accent1"/>
+                </a:solidFill>
+              </a:rPr>
               <a:t>2) Describe the questions you asked, and why you asked them.</a:t>
             </a:r>
           </a:p>
@@ -4726,10 +7623,18 @@
           </a:p>
           <a:p>
             <a:br>
-              <a:rPr lang="en-US" b="1" dirty="0"/>
+              <a:rPr lang="en-US" b="1" dirty="0">
+                <a:solidFill>
+                  <a:schemeClr val="accent1"/>
+                </a:solidFill>
+              </a:rPr>
             </a:br>
             <a:r>
-              <a:rPr lang="en-US" b="1" dirty="0"/>
+              <a:rPr lang="en-US" b="1" dirty="0">
+                <a:solidFill>
+                  <a:schemeClr val="accent1"/>
+                </a:solidFill>
+              </a:rPr>
               <a:t>3) Describe whether you were able to answer these questions to your satisfaction, and briefly summarize your findings.</a:t>
             </a:r>
           </a:p>
@@ -4761,6 +7666,156 @@
 </file>
 
 <file path=ppt/slides/slide3.xml><?xml version="1.0" encoding="utf-8"?>
+<p:sld xmlns:a="http://schemas.openxmlformats.org/drawingml/2006/main" xmlns:r="http://schemas.openxmlformats.org/officeDocument/2006/relationships" xmlns:p="http://schemas.openxmlformats.org/presentationml/2006/main">
+  <p:cSld>
+    <p:spTree>
+      <p:nvGrpSpPr>
+        <p:cNvPr id="1" name=""/>
+        <p:cNvGrpSpPr/>
+        <p:nvPr/>
+      </p:nvGrpSpPr>
+      <p:grpSpPr>
+        <a:xfrm>
+          <a:off x="0" y="0"/>
+          <a:ext cx="0" cy="0"/>
+          <a:chOff x="0" y="0"/>
+          <a:chExt cx="0" cy="0"/>
+        </a:xfrm>
+      </p:grpSpPr>
+      <p:sp>
+        <p:nvSpPr>
+          <p:cNvPr id="2" name="Title 1">
+            <a:extLst>
+              <a:ext uri="{FF2B5EF4-FFF2-40B4-BE49-F238E27FC236}">
+                <a16:creationId xmlns:a16="http://schemas.microsoft.com/office/drawing/2014/main" id="{1346E2E6-C31F-4F88-90D3-09EF161C9852}"/>
+              </a:ext>
+            </a:extLst>
+          </p:cNvPr>
+          <p:cNvSpPr>
+            <a:spLocks noGrp="1"/>
+          </p:cNvSpPr>
+          <p:nvPr>
+            <p:ph type="title"/>
+          </p:nvPr>
+        </p:nvSpPr>
+        <p:spPr/>
+        <p:txBody>
+          <a:bodyPr/>
+          <a:lstStyle/>
+          <a:p>
+            <a:r>
+              <a:rPr lang="en-US" dirty="0"/>
+              <a:t>The JSON results and how to navigate the info</a:t>
+            </a:r>
+          </a:p>
+        </p:txBody>
+      </p:sp>
+      <p:sp>
+        <p:nvSpPr>
+          <p:cNvPr id="4" name="TextBox 3">
+            <a:extLst>
+              <a:ext uri="{FF2B5EF4-FFF2-40B4-BE49-F238E27FC236}">
+                <a16:creationId xmlns:a16="http://schemas.microsoft.com/office/drawing/2014/main" id="{1B9A8260-8E19-4D4A-8E7D-22698C0919E6}"/>
+              </a:ext>
+            </a:extLst>
+          </p:cNvPr>
+          <p:cNvSpPr txBox="1"/>
+          <p:nvPr/>
+        </p:nvSpPr>
+        <p:spPr>
+          <a:xfrm>
+            <a:off x="838200" y="1690688"/>
+            <a:ext cx="436418" cy="369332"/>
+          </a:xfrm>
+          <a:prstGeom prst="rect">
+            <a:avLst/>
+          </a:prstGeom>
+          <a:noFill/>
+        </p:spPr>
+        <p:txBody>
+          <a:bodyPr wrap="square" rtlCol="0">
+            <a:spAutoFit/>
+          </a:bodyPr>
+          <a:lstStyle/>
+          <a:p>
+            <a:endParaRPr lang="en-US" dirty="0"/>
+          </a:p>
+        </p:txBody>
+      </p:sp>
+      <p:pic>
+        <p:nvPicPr>
+          <p:cNvPr id="6" name="Picture 5">
+            <a:extLst>
+              <a:ext uri="{FF2B5EF4-FFF2-40B4-BE49-F238E27FC236}">
+                <a16:creationId xmlns:a16="http://schemas.microsoft.com/office/drawing/2014/main" id="{D0EDBBCA-0023-4A5C-805D-242CC9EC4703}"/>
+              </a:ext>
+            </a:extLst>
+          </p:cNvPr>
+          <p:cNvPicPr>
+            <a:picLocks noChangeAspect="1"/>
+          </p:cNvPicPr>
+          <p:nvPr/>
+        </p:nvPicPr>
+        <p:blipFill>
+          <a:blip r:embed="rId2"/>
+          <a:stretch>
+            <a:fillRect/>
+          </a:stretch>
+        </p:blipFill>
+        <p:spPr>
+          <a:xfrm>
+            <a:off x="540328" y="1276163"/>
+            <a:ext cx="5957454" cy="5216712"/>
+          </a:xfrm>
+          <a:prstGeom prst="rect">
+            <a:avLst/>
+          </a:prstGeom>
+        </p:spPr>
+      </p:pic>
+      <p:pic>
+        <p:nvPicPr>
+          <p:cNvPr id="7" name="Picture 6">
+            <a:extLst>
+              <a:ext uri="{FF2B5EF4-FFF2-40B4-BE49-F238E27FC236}">
+                <a16:creationId xmlns:a16="http://schemas.microsoft.com/office/drawing/2014/main" id="{E4FB378F-0E2B-4E40-AAD5-4F852144355D}"/>
+              </a:ext>
+            </a:extLst>
+          </p:cNvPr>
+          <p:cNvPicPr>
+            <a:picLocks noChangeAspect="1"/>
+          </p:cNvPicPr>
+          <p:nvPr/>
+        </p:nvPicPr>
+        <p:blipFill>
+          <a:blip r:embed="rId3"/>
+          <a:stretch>
+            <a:fillRect/>
+          </a:stretch>
+        </p:blipFill>
+        <p:spPr>
+          <a:xfrm>
+            <a:off x="6359236" y="1276163"/>
+            <a:ext cx="4433454" cy="5216712"/>
+          </a:xfrm>
+          <a:prstGeom prst="rect">
+            <a:avLst/>
+          </a:prstGeom>
+        </p:spPr>
+      </p:pic>
+    </p:spTree>
+    <p:extLst>
+      <p:ext uri="{BB962C8B-B14F-4D97-AF65-F5344CB8AC3E}">
+        <p14:creationId xmlns:p14="http://schemas.microsoft.com/office/powerpoint/2010/main" val="1331696419"/>
+      </p:ext>
+    </p:extLst>
+  </p:cSld>
+  <p:clrMapOvr>
+    <a:masterClrMapping/>
+  </p:clrMapOvr>
+</p:sld>
+</file>
+
+<file path=ppt/slides/slide4.xml><?xml version="1.0" encoding="utf-8"?>
 <p:sld xmlns:a="http://schemas.openxmlformats.org/drawingml/2006/main" xmlns:r="http://schemas.openxmlformats.org/officeDocument/2006/relationships" xmlns:p="http://schemas.openxmlformats.org/presentationml/2006/main">
   <p:cSld>
     <p:spTree>
@@ -4912,7 +7967,7 @@
 </p:sld>
 </file>
 
-<file path=ppt/slides/slide4.xml><?xml version="1.0" encoding="utf-8"?>
+<file path=ppt/slides/slide5.xml><?xml version="1.0" encoding="utf-8"?>
 <p:sld xmlns:a="http://schemas.openxmlformats.org/drawingml/2006/main" xmlns:r="http://schemas.openxmlformats.org/officeDocument/2006/relationships" xmlns:p="http://schemas.openxmlformats.org/presentationml/2006/main">
   <p:cSld>
     <p:spTree>
@@ -5065,7 +8120,7 @@
 </p:sld>
 </file>
 
-<file path=ppt/slides/slide5.xml><?xml version="1.0" encoding="utf-8"?>
+<file path=ppt/slides/slide6.xml><?xml version="1.0" encoding="utf-8"?>
 <p:sld xmlns:a="http://schemas.openxmlformats.org/drawingml/2006/main" xmlns:r="http://schemas.openxmlformats.org/officeDocument/2006/relationships" xmlns:p="http://schemas.openxmlformats.org/presentationml/2006/main">
   <p:cSld>
     <p:spTree>
@@ -5221,7 +8276,7 @@
 </p:sld>
 </file>
 
-<file path=ppt/slides/slide6.xml><?xml version="1.0" encoding="utf-8"?>
+<file path=ppt/slides/slide7.xml><?xml version="1.0" encoding="utf-8"?>
 <p:sld xmlns:a="http://schemas.openxmlformats.org/drawingml/2006/main" xmlns:r="http://schemas.openxmlformats.org/officeDocument/2006/relationships" xmlns:p="http://schemas.openxmlformats.org/presentationml/2006/main">
   <p:cSld>
     <p:spTree>
@@ -5367,36 +8422,6 @@
     <p:extLst>
       <p:ext uri="{BB962C8B-B14F-4D97-AF65-F5344CB8AC3E}">
         <p14:creationId xmlns:p14="http://schemas.microsoft.com/office/powerpoint/2010/main" val="350658691"/>
-      </p:ext>
-    </p:extLst>
-  </p:cSld>
-  <p:clrMapOvr>
-    <a:masterClrMapping/>
-  </p:clrMapOvr>
-</p:sld>
-</file>
-
-<file path=ppt/slides/slide7.xml><?xml version="1.0" encoding="utf-8"?>
-<p:sld xmlns:a="http://schemas.openxmlformats.org/drawingml/2006/main" xmlns:r="http://schemas.openxmlformats.org/officeDocument/2006/relationships" xmlns:p="http://schemas.openxmlformats.org/presentationml/2006/main">
-  <p:cSld>
-    <p:spTree>
-      <p:nvGrpSpPr>
-        <p:cNvPr id="1" name=""/>
-        <p:cNvGrpSpPr/>
-        <p:nvPr/>
-      </p:nvGrpSpPr>
-      <p:grpSpPr>
-        <a:xfrm>
-          <a:off x="0" y="0"/>
-          <a:ext cx="0" cy="0"/>
-          <a:chOff x="0" y="0"/>
-          <a:chExt cx="0" cy="0"/>
-        </a:xfrm>
-      </p:grpSpPr>
-    </p:spTree>
-    <p:extLst>
-      <p:ext uri="{BB962C8B-B14F-4D97-AF65-F5344CB8AC3E}">
-        <p14:creationId xmlns:p14="http://schemas.microsoft.com/office/powerpoint/2010/main" val="4281723840"/>
       </p:ext>
     </p:extLst>
   </p:cSld>
@@ -6023,4 +9048,299 @@
     </a:ext>
   </a:extLst>
 </a:theme>
+</file>
+
+<file path=ppt/theme/theme2.xml><?xml version="1.0" encoding="utf-8"?>
+<a:theme xmlns:a="http://schemas.openxmlformats.org/drawingml/2006/main" name="Office Theme">
+  <a:themeElements>
+    <a:clrScheme name="Office">
+      <a:dk1>
+        <a:sysClr val="windowText" lastClr="000000"/>
+      </a:dk1>
+      <a:lt1>
+        <a:sysClr val="window" lastClr="FFFFFF"/>
+      </a:lt1>
+      <a:dk2>
+        <a:srgbClr val="44546A"/>
+      </a:dk2>
+      <a:lt2>
+        <a:srgbClr val="E7E6E6"/>
+      </a:lt2>
+      <a:accent1>
+        <a:srgbClr val="4472C4"/>
+      </a:accent1>
+      <a:accent2>
+        <a:srgbClr val="ED7D31"/>
+      </a:accent2>
+      <a:accent3>
+        <a:srgbClr val="A5A5A5"/>
+      </a:accent3>
+      <a:accent4>
+        <a:srgbClr val="FFC000"/>
+      </a:accent4>
+      <a:accent5>
+        <a:srgbClr val="5B9BD5"/>
+      </a:accent5>
+      <a:accent6>
+        <a:srgbClr val="70AD47"/>
+      </a:accent6>
+      <a:hlink>
+        <a:srgbClr val="0563C1"/>
+      </a:hlink>
+      <a:folHlink>
+        <a:srgbClr val="954F72"/>
+      </a:folHlink>
+    </a:clrScheme>
+    <a:fontScheme name="Office">
+      <a:majorFont>
+        <a:latin typeface="Calibri Light" panose="020F0302020204030204"/>
+        <a:ea typeface=""/>
+        <a:cs typeface=""/>
+        <a:font script="Jpan" typeface="游ゴシック Light"/>
+        <a:font script="Hang" typeface="맑은 고딕"/>
+        <a:font script="Hans" typeface="等线 Light"/>
+        <a:font script="Hant" typeface="新細明體"/>
+        <a:font script="Arab" typeface="Times New Roman"/>
+        <a:font script="Hebr" typeface="Times New Roman"/>
+        <a:font script="Thai" typeface="Angsana New"/>
+        <a:font script="Ethi" typeface="Nyala"/>
+        <a:font script="Beng" typeface="Vrinda"/>
+        <a:font script="Gujr" typeface="Shruti"/>
+        <a:font script="Khmr" typeface="MoolBoran"/>
+        <a:font script="Knda" typeface="Tunga"/>
+        <a:font script="Guru" typeface="Raavi"/>
+        <a:font script="Cans" typeface="Euphemia"/>
+        <a:font script="Cher" typeface="Plantagenet Cherokee"/>
+        <a:font script="Yiii" typeface="Microsoft Yi Baiti"/>
+        <a:font script="Tibt" typeface="Microsoft Himalaya"/>
+        <a:font script="Thaa" typeface="MV Boli"/>
+        <a:font script="Deva" typeface="Mangal"/>
+        <a:font script="Telu" typeface="Gautami"/>
+        <a:font script="Taml" typeface="Latha"/>
+        <a:font script="Syrc" typeface="Estrangelo Edessa"/>
+        <a:font script="Orya" typeface="Kalinga"/>
+        <a:font script="Mlym" typeface="Kartika"/>
+        <a:font script="Laoo" typeface="DokChampa"/>
+        <a:font script="Sinh" typeface="Iskoola Pota"/>
+        <a:font script="Mong" typeface="Mongolian Baiti"/>
+        <a:font script="Viet" typeface="Times New Roman"/>
+        <a:font script="Uigh" typeface="Microsoft Uighur"/>
+        <a:font script="Geor" typeface="Sylfaen"/>
+        <a:font script="Armn" typeface="Arial"/>
+        <a:font script="Bugi" typeface="Leelawadee UI"/>
+        <a:font script="Bopo" typeface="Microsoft JhengHei"/>
+        <a:font script="Java" typeface="Javanese Text"/>
+        <a:font script="Lisu" typeface="Segoe UI"/>
+        <a:font script="Mymr" typeface="Myanmar Text"/>
+        <a:font script="Nkoo" typeface="Ebrima"/>
+        <a:font script="Olck" typeface="Nirmala UI"/>
+        <a:font script="Osma" typeface="Ebrima"/>
+        <a:font script="Phag" typeface="Phagspa"/>
+        <a:font script="Syrn" typeface="Estrangelo Edessa"/>
+        <a:font script="Syrj" typeface="Estrangelo Edessa"/>
+        <a:font script="Syre" typeface="Estrangelo Edessa"/>
+        <a:font script="Sora" typeface="Nirmala UI"/>
+        <a:font script="Tale" typeface="Microsoft Tai Le"/>
+        <a:font script="Talu" typeface="Microsoft New Tai Lue"/>
+        <a:font script="Tfng" typeface="Ebrima"/>
+      </a:majorFont>
+      <a:minorFont>
+        <a:latin typeface="Calibri" panose="020F0502020204030204"/>
+        <a:ea typeface=""/>
+        <a:cs typeface=""/>
+        <a:font script="Jpan" typeface="游ゴシック"/>
+        <a:font script="Hang" typeface="맑은 고딕"/>
+        <a:font script="Hans" typeface="等线"/>
+        <a:font script="Hant" typeface="新細明體"/>
+        <a:font script="Arab" typeface="Arial"/>
+        <a:font script="Hebr" typeface="Arial"/>
+        <a:font script="Thai" typeface="Cordia New"/>
+        <a:font script="Ethi" typeface="Nyala"/>
+        <a:font script="Beng" typeface="Vrinda"/>
+        <a:font script="Gujr" typeface="Shruti"/>
+        <a:font script="Khmr" typeface="DaunPenh"/>
+        <a:font script="Knda" typeface="Tunga"/>
+        <a:font script="Guru" typeface="Raavi"/>
+        <a:font script="Cans" typeface="Euphemia"/>
+        <a:font script="Cher" typeface="Plantagenet Cherokee"/>
+        <a:font script="Yiii" typeface="Microsoft Yi Baiti"/>
+        <a:font script="Tibt" typeface="Microsoft Himalaya"/>
+        <a:font script="Thaa" typeface="MV Boli"/>
+        <a:font script="Deva" typeface="Mangal"/>
+        <a:font script="Telu" typeface="Gautami"/>
+        <a:font script="Taml" typeface="Latha"/>
+        <a:font script="Syrc" typeface="Estrangelo Edessa"/>
+        <a:font script="Orya" typeface="Kalinga"/>
+        <a:font script="Mlym" typeface="Kartika"/>
+        <a:font script="Laoo" typeface="DokChampa"/>
+        <a:font script="Sinh" typeface="Iskoola Pota"/>
+        <a:font script="Mong" typeface="Mongolian Baiti"/>
+        <a:font script="Viet" typeface="Arial"/>
+        <a:font script="Uigh" typeface="Microsoft Uighur"/>
+        <a:font script="Geor" typeface="Sylfaen"/>
+        <a:font script="Armn" typeface="Arial"/>
+        <a:font script="Bugi" typeface="Leelawadee UI"/>
+        <a:font script="Bopo" typeface="Microsoft JhengHei"/>
+        <a:font script="Java" typeface="Javanese Text"/>
+        <a:font script="Lisu" typeface="Segoe UI"/>
+        <a:font script="Mymr" typeface="Myanmar Text"/>
+        <a:font script="Nkoo" typeface="Ebrima"/>
+        <a:font script="Olck" typeface="Nirmala UI"/>
+        <a:font script="Osma" typeface="Ebrima"/>
+        <a:font script="Phag" typeface="Phagspa"/>
+        <a:font script="Syrn" typeface="Estrangelo Edessa"/>
+        <a:font script="Syrj" typeface="Estrangelo Edessa"/>
+        <a:font script="Syre" typeface="Estrangelo Edessa"/>
+        <a:font script="Sora" typeface="Nirmala UI"/>
+        <a:font script="Tale" typeface="Microsoft Tai Le"/>
+        <a:font script="Talu" typeface="Microsoft New Tai Lue"/>
+        <a:font script="Tfng" typeface="Ebrima"/>
+      </a:minorFont>
+    </a:fontScheme>
+    <a:fmtScheme name="Office">
+      <a:fillStyleLst>
+        <a:solidFill>
+          <a:schemeClr val="phClr"/>
+        </a:solidFill>
+        <a:gradFill rotWithShape="1">
+          <a:gsLst>
+            <a:gs pos="0">
+              <a:schemeClr val="phClr">
+                <a:lumMod val="110000"/>
+                <a:satMod val="105000"/>
+                <a:tint val="67000"/>
+              </a:schemeClr>
+            </a:gs>
+            <a:gs pos="50000">
+              <a:schemeClr val="phClr">
+                <a:lumMod val="105000"/>
+                <a:satMod val="103000"/>
+                <a:tint val="73000"/>
+              </a:schemeClr>
+            </a:gs>
+            <a:gs pos="100000">
+              <a:schemeClr val="phClr">
+                <a:lumMod val="105000"/>
+                <a:satMod val="109000"/>
+                <a:tint val="81000"/>
+              </a:schemeClr>
+            </a:gs>
+          </a:gsLst>
+          <a:lin ang="5400000" scaled="0"/>
+        </a:gradFill>
+        <a:gradFill rotWithShape="1">
+          <a:gsLst>
+            <a:gs pos="0">
+              <a:schemeClr val="phClr">
+                <a:satMod val="103000"/>
+                <a:lumMod val="102000"/>
+                <a:tint val="94000"/>
+              </a:schemeClr>
+            </a:gs>
+            <a:gs pos="50000">
+              <a:schemeClr val="phClr">
+                <a:satMod val="110000"/>
+                <a:lumMod val="100000"/>
+                <a:shade val="100000"/>
+              </a:schemeClr>
+            </a:gs>
+            <a:gs pos="100000">
+              <a:schemeClr val="phClr">
+                <a:lumMod val="99000"/>
+                <a:satMod val="120000"/>
+                <a:shade val="78000"/>
+              </a:schemeClr>
+            </a:gs>
+          </a:gsLst>
+          <a:lin ang="5400000" scaled="0"/>
+        </a:gradFill>
+      </a:fillStyleLst>
+      <a:lnStyleLst>
+        <a:ln w="6350" cap="flat" cmpd="sng" algn="ctr">
+          <a:solidFill>
+            <a:schemeClr val="phClr"/>
+          </a:solidFill>
+          <a:prstDash val="solid"/>
+          <a:miter lim="800000"/>
+        </a:ln>
+        <a:ln w="12700" cap="flat" cmpd="sng" algn="ctr">
+          <a:solidFill>
+            <a:schemeClr val="phClr"/>
+          </a:solidFill>
+          <a:prstDash val="solid"/>
+          <a:miter lim="800000"/>
+        </a:ln>
+        <a:ln w="19050" cap="flat" cmpd="sng" algn="ctr">
+          <a:solidFill>
+            <a:schemeClr val="phClr"/>
+          </a:solidFill>
+          <a:prstDash val="solid"/>
+          <a:miter lim="800000"/>
+        </a:ln>
+      </a:lnStyleLst>
+      <a:effectStyleLst>
+        <a:effectStyle>
+          <a:effectLst/>
+        </a:effectStyle>
+        <a:effectStyle>
+          <a:effectLst/>
+        </a:effectStyle>
+        <a:effectStyle>
+          <a:effectLst>
+            <a:outerShdw blurRad="57150" dist="19050" dir="5400000" algn="ctr" rotWithShape="0">
+              <a:srgbClr val="000000">
+                <a:alpha val="63000"/>
+              </a:srgbClr>
+            </a:outerShdw>
+          </a:effectLst>
+        </a:effectStyle>
+      </a:effectStyleLst>
+      <a:bgFillStyleLst>
+        <a:solidFill>
+          <a:schemeClr val="phClr"/>
+        </a:solidFill>
+        <a:solidFill>
+          <a:schemeClr val="phClr">
+            <a:tint val="95000"/>
+            <a:satMod val="170000"/>
+          </a:schemeClr>
+        </a:solidFill>
+        <a:gradFill rotWithShape="1">
+          <a:gsLst>
+            <a:gs pos="0">
+              <a:schemeClr val="phClr">
+                <a:tint val="93000"/>
+                <a:satMod val="150000"/>
+                <a:shade val="98000"/>
+                <a:lumMod val="102000"/>
+              </a:schemeClr>
+            </a:gs>
+            <a:gs pos="50000">
+              <a:schemeClr val="phClr">
+                <a:tint val="98000"/>
+                <a:satMod val="130000"/>
+                <a:shade val="90000"/>
+                <a:lumMod val="103000"/>
+              </a:schemeClr>
+            </a:gs>
+            <a:gs pos="100000">
+              <a:schemeClr val="phClr">
+                <a:shade val="63000"/>
+                <a:satMod val="120000"/>
+              </a:schemeClr>
+            </a:gs>
+          </a:gsLst>
+          <a:lin ang="5400000" scaled="0"/>
+        </a:gradFill>
+      </a:bgFillStyleLst>
+    </a:fmtScheme>
+  </a:themeElements>
+  <a:objectDefaults/>
+  <a:extraClrSchemeLst/>
+  <a:extLst>
+    <a:ext uri="{05A4C25C-085E-4340-85A3-A5531E510DB2}">
+      <thm15:themeFamily xmlns:thm15="http://schemas.microsoft.com/office/thememl/2012/main" name="Office Theme" id="{62F939B6-93AF-4DB8-9C6B-D6C7DFDC589F}" vid="{4A3C46E8-61CC-4603-A589-7422A47A8E4A}"/>
+    </a:ext>
+  </a:extLst>
+</a:theme>
 </file>
</xml_diff>